<commit_message>
Powerpoint Project definisi selesai
</commit_message>
<xml_diff>
--- a/Presentasi-Statistika-kelompok-3.pptx
+++ b/Presentasi-Statistika-kelompok-3.pptx
@@ -7,7 +7,7 @@
     <p:sldMasterId id="2147483653" r:id="rId3"/>
   </p:sldMasterIdLst>
   <p:notesMasterIdLst>
-    <p:notesMasterId r:id="rId13"/>
+    <p:notesMasterId r:id="rId17"/>
   </p:notesMasterIdLst>
   <p:sldIdLst>
     <p:sldId id="256" r:id="rId4"/>
@@ -19,6 +19,10 @@
     <p:sldId id="298" r:id="rId10"/>
     <p:sldId id="299" r:id="rId11"/>
     <p:sldId id="300" r:id="rId12"/>
+    <p:sldId id="301" r:id="rId13"/>
+    <p:sldId id="302" r:id="rId14"/>
+    <p:sldId id="303" r:id="rId15"/>
+    <p:sldId id="304" r:id="rId16"/>
   </p:sldIdLst>
   <p:sldSz cx="9144000" cy="5143500" type="screen16x9"/>
   <p:notesSz cx="6858000" cy="9144000"/>
@@ -5212,6 +5216,1221 @@
     <p:extLst>
       <p:ext uri="{BB962C8B-B14F-4D97-AF65-F5344CB8AC3E}">
         <p14:creationId xmlns:p14="http://schemas.microsoft.com/office/powerpoint/2010/main" val="2971841378"/>
+      </p:ext>
+    </p:extLst>
+  </p:cSld>
+  <p:clrMapOvr>
+    <a:masterClrMapping/>
+  </p:clrMapOvr>
+</p:sld>
+</file>
+
+<file path=ppt/slides/slide10.xml><?xml version="1.0" encoding="utf-8"?>
+<p:sld xmlns:a="http://schemas.openxmlformats.org/drawingml/2006/main" xmlns:r="http://schemas.openxmlformats.org/officeDocument/2006/relationships" xmlns:p="http://schemas.openxmlformats.org/presentationml/2006/main">
+  <p:cSld>
+    <p:spTree>
+      <p:nvGrpSpPr>
+        <p:cNvPr id="1" name=""/>
+        <p:cNvGrpSpPr/>
+        <p:nvPr/>
+      </p:nvGrpSpPr>
+      <p:grpSpPr>
+        <a:xfrm>
+          <a:off x="0" y="0"/>
+          <a:ext cx="0" cy="0"/>
+          <a:chOff x="0" y="0"/>
+          <a:chExt cx="0" cy="0"/>
+        </a:xfrm>
+      </p:grpSpPr>
+      <p:sp>
+        <p:nvSpPr>
+          <p:cNvPr id="2" name="Text Placeholder 1"/>
+          <p:cNvSpPr>
+            <a:spLocks noGrp="1"/>
+          </p:cNvSpPr>
+          <p:nvPr>
+            <p:ph type="body" sz="quarter" idx="10"/>
+          </p:nvPr>
+        </p:nvSpPr>
+        <p:spPr/>
+        <p:txBody>
+          <a:bodyPr/>
+          <a:lstStyle/>
+          <a:p>
+            <a:r>
+              <a:rPr lang="en-US" altLang="ko-KR" dirty="0" err="1"/>
+              <a:t>Definisi</a:t>
+            </a:r>
+            <a:endParaRPr lang="ko-KR" altLang="en-US" dirty="0"/>
+          </a:p>
+        </p:txBody>
+      </p:sp>
+      <p:sp>
+        <p:nvSpPr>
+          <p:cNvPr id="3" name="Text Placeholder 2"/>
+          <p:cNvSpPr>
+            <a:spLocks noGrp="1"/>
+          </p:cNvSpPr>
+          <p:nvPr>
+            <p:ph type="body" sz="quarter" idx="11"/>
+          </p:nvPr>
+        </p:nvSpPr>
+        <p:spPr/>
+        <p:txBody>
+          <a:bodyPr/>
+          <a:lstStyle/>
+          <a:p>
+            <a:pPr lvl="0"/>
+            <a:r>
+              <a:rPr lang="en-US" altLang="ko-KR" b="1" dirty="0" err="1"/>
+              <a:t>Simpangan</a:t>
+            </a:r>
+            <a:r>
+              <a:rPr lang="en-US" altLang="ko-KR" b="1" dirty="0"/>
+              <a:t> Baku</a:t>
+            </a:r>
+          </a:p>
+        </p:txBody>
+      </p:sp>
+      <mc:AlternateContent xmlns:mc="http://schemas.openxmlformats.org/markup-compatibility/2006">
+        <mc:Choice xmlns:a14="http://schemas.microsoft.com/office/drawing/2010/main" Requires="a14">
+          <p:sp>
+            <p:nvSpPr>
+              <p:cNvPr id="5" name="TextBox 4"/>
+              <p:cNvSpPr txBox="1"/>
+              <p:nvPr/>
+            </p:nvSpPr>
+            <p:spPr>
+              <a:xfrm>
+                <a:off x="4572000" y="2260547"/>
+                <a:ext cx="4176464" cy="622414"/>
+              </a:xfrm>
+              <a:prstGeom prst="rect">
+                <a:avLst/>
+              </a:prstGeom>
+              <a:noFill/>
+            </p:spPr>
+            <p:txBody>
+              <a:bodyPr wrap="square" rtlCol="0" anchor="ctr">
+                <a:spAutoFit/>
+              </a:bodyPr>
+              <a:lstStyle/>
+              <a:p>
+                <a:r>
+                  <a:rPr lang="en-US" altLang="ko-KR" sz="1600" dirty="0">
+                    <a:cs typeface="Arial" pitchFamily="34" charset="0"/>
+                  </a:rPr>
+                  <a:t>Akar </a:t>
+                </a:r>
+                <a:r>
+                  <a:rPr lang="en-US" altLang="ko-KR" sz="1600" dirty="0" err="1">
+                    <a:cs typeface="Arial" pitchFamily="34" charset="0"/>
+                  </a:rPr>
+                  <a:t>pangkat</a:t>
+                </a:r>
+                <a:r>
+                  <a:rPr lang="en-US" altLang="ko-KR" sz="1600" dirty="0">
+                    <a:cs typeface="Arial" pitchFamily="34" charset="0"/>
+                  </a:rPr>
+                  <a:t> </a:t>
+                </a:r>
+                <a:r>
+                  <a:rPr lang="en-US" altLang="ko-KR" sz="1600" dirty="0" err="1">
+                    <a:cs typeface="Arial" pitchFamily="34" charset="0"/>
+                  </a:rPr>
+                  <a:t>dua</a:t>
+                </a:r>
+                <a:r>
+                  <a:rPr lang="en-US" altLang="ko-KR" sz="1600" dirty="0">
+                    <a:cs typeface="Arial" pitchFamily="34" charset="0"/>
+                  </a:rPr>
+                  <a:t> </a:t>
+                </a:r>
+                <a:r>
+                  <a:rPr lang="en-US" altLang="ko-KR" sz="1600" dirty="0" err="1">
+                    <a:cs typeface="Arial" pitchFamily="34" charset="0"/>
+                  </a:rPr>
+                  <a:t>dari</a:t>
+                </a:r>
+                <a:r>
+                  <a:rPr lang="en-US" altLang="ko-KR" sz="1600" dirty="0">
+                    <a:cs typeface="Arial" pitchFamily="34" charset="0"/>
+                  </a:rPr>
+                  <a:t> </a:t>
+                </a:r>
+                <a:r>
+                  <a:rPr lang="en-US" altLang="ko-KR" sz="1600" dirty="0" err="1">
+                    <a:cs typeface="Arial" pitchFamily="34" charset="0"/>
+                  </a:rPr>
+                  <a:t>variasi</a:t>
+                </a:r>
+                <a:r>
+                  <a:rPr lang="en-US" altLang="ko-KR" sz="1600" dirty="0">
+                    <a:cs typeface="Arial" pitchFamily="34" charset="0"/>
+                  </a:rPr>
+                  <a:t> </a:t>
+                </a:r>
+                <a:r>
+                  <a:rPr lang="en-US" altLang="ko-KR" sz="1600" dirty="0" err="1">
+                    <a:cs typeface="Arial" pitchFamily="34" charset="0"/>
+                  </a:rPr>
+                  <a:t>simpangan</a:t>
+                </a:r>
+                <a:endParaRPr lang="en-US" altLang="ko-KR" sz="1600" dirty="0">
+                  <a:cs typeface="Arial" pitchFamily="34" charset="0"/>
+                </a:endParaRPr>
+              </a:p>
+              <a:p>
+                <a:r>
+                  <a:rPr lang="en-US" altLang="ko-KR" sz="1600" dirty="0">
+                    <a:cs typeface="Arial" pitchFamily="34" charset="0"/>
+                  </a:rPr>
+                  <a:t>Baku (S) = </a:t>
+                </a:r>
+                <a14:m>
+                  <m:oMath xmlns:m="http://schemas.openxmlformats.org/officeDocument/2006/math">
+                    <m:r>
+                      <a:rPr lang="en-US" altLang="ko-KR" sz="1600" i="1" smtClean="0">
+                        <a:latin typeface="Cambria Math" panose="02040503050406030204" pitchFamily="18" charset="0"/>
+                        <a:ea typeface="Cambria Math" panose="02040503050406030204" pitchFamily="18" charset="0"/>
+                        <a:cs typeface="Arial" pitchFamily="34" charset="0"/>
+                      </a:rPr>
+                      <m:t>√</m:t>
+                    </m:r>
+                  </m:oMath>
+                </a14:m>
+                <a:r>
+                  <a:rPr lang="en-US" altLang="ko-KR" sz="1600" dirty="0">
+                    <a:cs typeface="Arial" pitchFamily="34" charset="0"/>
+                  </a:rPr>
+                  <a:t> </a:t>
+                </a:r>
+                <a14:m>
+                  <m:oMath xmlns:m="http://schemas.openxmlformats.org/officeDocument/2006/math">
+                    <m:sSup>
+                      <m:sSupPr>
+                        <m:ctrlPr>
+                          <a:rPr lang="en-US" altLang="ko-KR" sz="1600" i="1" dirty="0" smtClean="0">
+                            <a:latin typeface="Cambria Math" panose="02040503050406030204" pitchFamily="18" charset="0"/>
+                            <a:cs typeface="Arial" pitchFamily="34" charset="0"/>
+                          </a:rPr>
+                        </m:ctrlPr>
+                      </m:sSupPr>
+                      <m:e>
+                        <m:r>
+                          <a:rPr lang="en-US" altLang="ko-KR" sz="1600" b="0" i="1" dirty="0" smtClean="0">
+                            <a:latin typeface="Cambria Math" panose="02040503050406030204" pitchFamily="18" charset="0"/>
+                            <a:cs typeface="Arial" pitchFamily="34" charset="0"/>
+                          </a:rPr>
+                          <m:t>𝑠</m:t>
+                        </m:r>
+                      </m:e>
+                      <m:sup>
+                        <m:r>
+                          <a:rPr lang="en-US" altLang="ko-KR" sz="1600" i="1" dirty="0" smtClean="0">
+                            <a:latin typeface="Cambria Math" panose="02040503050406030204" pitchFamily="18" charset="0"/>
+                            <a:cs typeface="Arial" pitchFamily="34" charset="0"/>
+                          </a:rPr>
+                          <m:t>2</m:t>
+                        </m:r>
+                      </m:sup>
+                    </m:sSup>
+                  </m:oMath>
+                </a14:m>
+                <a:endParaRPr lang="en-US" altLang="ko-KR" sz="1600" dirty="0">
+                  <a:cs typeface="Arial" pitchFamily="34" charset="0"/>
+                </a:endParaRPr>
+              </a:p>
+            </p:txBody>
+          </p:sp>
+        </mc:Choice>
+        <mc:Fallback>
+          <p:sp>
+            <p:nvSpPr>
+              <p:cNvPr id="5" name="TextBox 4"/>
+              <p:cNvSpPr txBox="1">
+                <a:spLocks noRot="1" noChangeAspect="1" noMove="1" noResize="1" noEditPoints="1" noAdjustHandles="1" noChangeArrowheads="1" noChangeShapeType="1" noTextEdit="1"/>
+              </p:cNvSpPr>
+              <p:nvPr/>
+            </p:nvSpPr>
+            <p:spPr>
+              <a:xfrm>
+                <a:off x="4572000" y="2260547"/>
+                <a:ext cx="4176464" cy="622414"/>
+              </a:xfrm>
+              <a:prstGeom prst="rect">
+                <a:avLst/>
+              </a:prstGeom>
+              <a:blipFill>
+                <a:blip r:embed="rId2"/>
+                <a:stretch>
+                  <a:fillRect l="-730" t="-980" b="-10784"/>
+                </a:stretch>
+              </a:blipFill>
+            </p:spPr>
+            <p:txBody>
+              <a:bodyPr/>
+              <a:lstStyle/>
+              <a:p>
+                <a:r>
+                  <a:rPr lang="en-US">
+                    <a:noFill/>
+                  </a:rPr>
+                  <a:t> </a:t>
+                </a:r>
+              </a:p>
+            </p:txBody>
+          </p:sp>
+        </mc:Fallback>
+      </mc:AlternateContent>
+      <p:pic>
+        <p:nvPicPr>
+          <p:cNvPr id="6" name="Picture 5">
+            <a:extLst>
+              <a:ext uri="{FF2B5EF4-FFF2-40B4-BE49-F238E27FC236}">
+                <a16:creationId xmlns:a16="http://schemas.microsoft.com/office/drawing/2014/main" id="{57529BAC-E5D8-4DA6-AC40-291E9DDF15BB}"/>
+              </a:ext>
+            </a:extLst>
+          </p:cNvPr>
+          <p:cNvPicPr>
+            <a:picLocks noChangeAspect="1"/>
+          </p:cNvPicPr>
+          <p:nvPr/>
+        </p:nvPicPr>
+        <p:blipFill>
+          <a:blip r:embed="rId3">
+            <a:extLst>
+              <a:ext uri="{28A0092B-C50C-407E-A947-70E740481C1C}">
+                <a14:useLocalDpi xmlns:a14="http://schemas.microsoft.com/office/drawing/2010/main" val="0"/>
+              </a:ext>
+            </a:extLst>
+          </a:blip>
+          <a:stretch>
+            <a:fillRect/>
+          </a:stretch>
+        </p:blipFill>
+        <p:spPr>
+          <a:xfrm>
+            <a:off x="827584" y="1851670"/>
+            <a:ext cx="3302207" cy="1656184"/>
+          </a:xfrm>
+          <a:prstGeom prst="rect">
+            <a:avLst/>
+          </a:prstGeom>
+        </p:spPr>
+      </p:pic>
+    </p:spTree>
+    <p:extLst>
+      <p:ext uri="{BB962C8B-B14F-4D97-AF65-F5344CB8AC3E}">
+        <p14:creationId xmlns:p14="http://schemas.microsoft.com/office/powerpoint/2010/main" val="1778429510"/>
+      </p:ext>
+    </p:extLst>
+  </p:cSld>
+  <p:clrMapOvr>
+    <a:masterClrMapping/>
+  </p:clrMapOvr>
+</p:sld>
+</file>
+
+<file path=ppt/slides/slide11.xml><?xml version="1.0" encoding="utf-8"?>
+<p:sld xmlns:a="http://schemas.openxmlformats.org/drawingml/2006/main" xmlns:r="http://schemas.openxmlformats.org/officeDocument/2006/relationships" xmlns:p="http://schemas.openxmlformats.org/presentationml/2006/main">
+  <p:cSld>
+    <p:spTree>
+      <p:nvGrpSpPr>
+        <p:cNvPr id="1" name=""/>
+        <p:cNvGrpSpPr/>
+        <p:nvPr/>
+      </p:nvGrpSpPr>
+      <p:grpSpPr>
+        <a:xfrm>
+          <a:off x="0" y="0"/>
+          <a:ext cx="0" cy="0"/>
+          <a:chOff x="0" y="0"/>
+          <a:chExt cx="0" cy="0"/>
+        </a:xfrm>
+      </p:grpSpPr>
+      <p:sp>
+        <p:nvSpPr>
+          <p:cNvPr id="2" name="Text Placeholder 1"/>
+          <p:cNvSpPr>
+            <a:spLocks noGrp="1"/>
+          </p:cNvSpPr>
+          <p:nvPr>
+            <p:ph type="body" sz="quarter" idx="10"/>
+          </p:nvPr>
+        </p:nvSpPr>
+        <p:spPr/>
+        <p:txBody>
+          <a:bodyPr/>
+          <a:lstStyle/>
+          <a:p>
+            <a:r>
+              <a:rPr lang="en-US" altLang="ko-KR" dirty="0" err="1"/>
+              <a:t>Definisi</a:t>
+            </a:r>
+            <a:endParaRPr lang="ko-KR" altLang="en-US" dirty="0"/>
+          </a:p>
+        </p:txBody>
+      </p:sp>
+      <p:sp>
+        <p:nvSpPr>
+          <p:cNvPr id="3" name="Text Placeholder 2"/>
+          <p:cNvSpPr>
+            <a:spLocks noGrp="1"/>
+          </p:cNvSpPr>
+          <p:nvPr>
+            <p:ph type="body" sz="quarter" idx="11"/>
+          </p:nvPr>
+        </p:nvSpPr>
+        <p:spPr/>
+        <p:txBody>
+          <a:bodyPr/>
+          <a:lstStyle/>
+          <a:p>
+            <a:pPr lvl="0"/>
+            <a:r>
+              <a:rPr lang="en-US" altLang="ko-KR" b="1" dirty="0" err="1"/>
+              <a:t>Jangkauan</a:t>
+            </a:r>
+            <a:r>
+              <a:rPr lang="en-US" altLang="ko-KR" b="1" dirty="0"/>
+              <a:t> </a:t>
+            </a:r>
+            <a:r>
+              <a:rPr lang="en-US" altLang="ko-KR" b="1" dirty="0" err="1"/>
+              <a:t>Kuartil</a:t>
+            </a:r>
+            <a:endParaRPr lang="en-US" altLang="ko-KR" b="1" dirty="0"/>
+          </a:p>
+        </p:txBody>
+      </p:sp>
+      <p:sp>
+        <p:nvSpPr>
+          <p:cNvPr id="5" name="TextBox 4"/>
+          <p:cNvSpPr txBox="1"/>
+          <p:nvPr/>
+        </p:nvSpPr>
+        <p:spPr>
+          <a:xfrm>
+            <a:off x="4572000" y="1563638"/>
+            <a:ext cx="4176464" cy="584775"/>
+          </a:xfrm>
+          <a:prstGeom prst="rect">
+            <a:avLst/>
+          </a:prstGeom>
+          <a:noFill/>
+        </p:spPr>
+        <p:txBody>
+          <a:bodyPr wrap="square" rtlCol="0" anchor="ctr">
+            <a:spAutoFit/>
+          </a:bodyPr>
+          <a:lstStyle/>
+          <a:p>
+            <a:r>
+              <a:rPr lang="en-US" altLang="ko-KR" sz="1600" dirty="0" err="1">
+                <a:cs typeface="Arial" pitchFamily="34" charset="0"/>
+              </a:rPr>
+              <a:t>Disebut</a:t>
+            </a:r>
+            <a:r>
+              <a:rPr lang="en-US" altLang="ko-KR" sz="1600" dirty="0">
+                <a:cs typeface="Arial" pitchFamily="34" charset="0"/>
+              </a:rPr>
+              <a:t> juga </a:t>
+            </a:r>
+            <a:r>
+              <a:rPr lang="en-US" altLang="ko-KR" sz="1600" dirty="0" err="1">
+                <a:cs typeface="Arial" pitchFamily="34" charset="0"/>
+              </a:rPr>
+              <a:t>simpangan</a:t>
+            </a:r>
+            <a:r>
+              <a:rPr lang="en-US" altLang="ko-KR" sz="1600" dirty="0">
+                <a:cs typeface="Arial" pitchFamily="34" charset="0"/>
+              </a:rPr>
+              <a:t> </a:t>
+            </a:r>
+            <a:r>
+              <a:rPr lang="en-US" altLang="ko-KR" sz="1600" dirty="0" err="1">
+                <a:cs typeface="Arial" pitchFamily="34" charset="0"/>
+              </a:rPr>
+              <a:t>kuartil</a:t>
+            </a:r>
+            <a:r>
+              <a:rPr lang="en-US" altLang="ko-KR" sz="1600" dirty="0">
+                <a:cs typeface="Arial" pitchFamily="34" charset="0"/>
+              </a:rPr>
+              <a:t> </a:t>
+            </a:r>
+            <a:r>
+              <a:rPr lang="en-US" altLang="ko-KR" sz="1600" dirty="0" err="1">
+                <a:cs typeface="Arial" pitchFamily="34" charset="0"/>
+              </a:rPr>
+              <a:t>atau</a:t>
+            </a:r>
+            <a:r>
+              <a:rPr lang="en-US" altLang="ko-KR" sz="1600" dirty="0">
+                <a:cs typeface="Arial" pitchFamily="34" charset="0"/>
+              </a:rPr>
+              <a:t> </a:t>
+            </a:r>
+            <a:r>
+              <a:rPr lang="en-US" altLang="ko-KR" sz="1600" dirty="0" err="1">
+                <a:cs typeface="Arial" pitchFamily="34" charset="0"/>
+              </a:rPr>
+              <a:t>rentang</a:t>
+            </a:r>
+            <a:endParaRPr lang="en-US" altLang="ko-KR" sz="1600" dirty="0">
+              <a:cs typeface="Arial" pitchFamily="34" charset="0"/>
+            </a:endParaRPr>
+          </a:p>
+          <a:p>
+            <a:r>
+              <a:rPr lang="en-US" altLang="ko-KR" sz="1600" dirty="0">
+                <a:cs typeface="Arial" pitchFamily="34" charset="0"/>
+              </a:rPr>
+              <a:t>semi </a:t>
+            </a:r>
+            <a:r>
+              <a:rPr lang="en-US" altLang="ko-KR" sz="1600" dirty="0" err="1">
+                <a:cs typeface="Arial" pitchFamily="34" charset="0"/>
+              </a:rPr>
+              <a:t>antar</a:t>
+            </a:r>
+            <a:r>
+              <a:rPr lang="en-US" altLang="ko-KR" sz="1600" dirty="0">
+                <a:cs typeface="Arial" pitchFamily="34" charset="0"/>
+              </a:rPr>
+              <a:t> </a:t>
+            </a:r>
+            <a:r>
+              <a:rPr lang="en-US" altLang="ko-KR" sz="1600" dirty="0" err="1">
+                <a:cs typeface="Arial" pitchFamily="34" charset="0"/>
+              </a:rPr>
+              <a:t>kuartil</a:t>
+            </a:r>
+            <a:r>
+              <a:rPr lang="en-US" altLang="ko-KR" sz="1600" dirty="0">
+                <a:cs typeface="Arial" pitchFamily="34" charset="0"/>
+              </a:rPr>
+              <a:t> </a:t>
+            </a:r>
+            <a:r>
+              <a:rPr lang="en-US" altLang="ko-KR" sz="1600" dirty="0" err="1">
+                <a:cs typeface="Arial" pitchFamily="34" charset="0"/>
+              </a:rPr>
+              <a:t>atau</a:t>
+            </a:r>
+            <a:r>
+              <a:rPr lang="en-US" altLang="ko-KR" sz="1600" dirty="0">
+                <a:cs typeface="Arial" pitchFamily="34" charset="0"/>
+              </a:rPr>
+              <a:t> </a:t>
+            </a:r>
+            <a:r>
+              <a:rPr lang="en-US" altLang="ko-KR" sz="1600" dirty="0" err="1">
+                <a:cs typeface="Arial" pitchFamily="34" charset="0"/>
+              </a:rPr>
+              <a:t>deviasi</a:t>
+            </a:r>
+            <a:r>
+              <a:rPr lang="en-US" altLang="ko-KR" sz="1600" dirty="0">
+                <a:cs typeface="Arial" pitchFamily="34" charset="0"/>
+              </a:rPr>
+              <a:t> </a:t>
+            </a:r>
+            <a:r>
+              <a:rPr lang="en-US" altLang="ko-KR" sz="1600" dirty="0" err="1">
+                <a:cs typeface="Arial" pitchFamily="34" charset="0"/>
+              </a:rPr>
+              <a:t>kuartil</a:t>
+            </a:r>
+            <a:endParaRPr lang="en-US" altLang="ko-KR" sz="1600" dirty="0">
+              <a:cs typeface="Arial" pitchFamily="34" charset="0"/>
+            </a:endParaRPr>
+          </a:p>
+        </p:txBody>
+      </p:sp>
+      <p:pic>
+        <p:nvPicPr>
+          <p:cNvPr id="4" name="Picture 3">
+            <a:extLst>
+              <a:ext uri="{FF2B5EF4-FFF2-40B4-BE49-F238E27FC236}">
+                <a16:creationId xmlns:a16="http://schemas.microsoft.com/office/drawing/2014/main" id="{C27B93EB-9127-4B37-890D-4B37860BA564}"/>
+              </a:ext>
+            </a:extLst>
+          </p:cNvPr>
+          <p:cNvPicPr>
+            <a:picLocks noChangeAspect="1"/>
+          </p:cNvPicPr>
+          <p:nvPr/>
+        </p:nvPicPr>
+        <p:blipFill>
+          <a:blip r:embed="rId2">
+            <a:clrChange>
+              <a:clrFrom>
+                <a:srgbClr val="FFFFFF"/>
+              </a:clrFrom>
+              <a:clrTo>
+                <a:srgbClr val="FFFFFF">
+                  <a:alpha val="0"/>
+                </a:srgbClr>
+              </a:clrTo>
+            </a:clrChange>
+            <a:extLst>
+              <a:ext uri="{BEBA8EAE-BF5A-486C-A8C5-ECC9F3942E4B}">
+                <a14:imgProps xmlns:a14="http://schemas.microsoft.com/office/drawing/2010/main">
+                  <a14:imgLayer r:embed="rId3">
+                    <a14:imgEffect>
+                      <a14:saturation sat="200000"/>
+                    </a14:imgEffect>
+                  </a14:imgLayer>
+                </a14:imgProps>
+              </a:ext>
+            </a:extLst>
+          </a:blip>
+          <a:stretch>
+            <a:fillRect/>
+          </a:stretch>
+        </p:blipFill>
+        <p:spPr>
+          <a:xfrm>
+            <a:off x="4644008" y="2300982"/>
+            <a:ext cx="3194868" cy="1198782"/>
+          </a:xfrm>
+          <a:prstGeom prst="rect">
+            <a:avLst/>
+          </a:prstGeom>
+        </p:spPr>
+      </p:pic>
+      <p:sp>
+        <p:nvSpPr>
+          <p:cNvPr id="8" name="TextBox 7">
+            <a:extLst>
+              <a:ext uri="{FF2B5EF4-FFF2-40B4-BE49-F238E27FC236}">
+                <a16:creationId xmlns:a16="http://schemas.microsoft.com/office/drawing/2014/main" id="{19611154-22EA-4008-B195-364F27E6F1C5}"/>
+              </a:ext>
+            </a:extLst>
+          </p:cNvPr>
+          <p:cNvSpPr txBox="1"/>
+          <p:nvPr/>
+        </p:nvSpPr>
+        <p:spPr>
+          <a:xfrm>
+            <a:off x="971600" y="1040417"/>
+            <a:ext cx="2520280" cy="2215991"/>
+          </a:xfrm>
+          <a:prstGeom prst="rect">
+            <a:avLst/>
+          </a:prstGeom>
+          <a:noFill/>
+        </p:spPr>
+        <p:txBody>
+          <a:bodyPr wrap="square" rtlCol="0" anchor="ctr">
+            <a:spAutoFit/>
+          </a:bodyPr>
+          <a:lstStyle/>
+          <a:p>
+            <a:pPr algn="ctr"/>
+            <a:r>
+              <a:rPr lang="en-US" sz="13800" dirty="0">
+                <a:solidFill>
+                  <a:schemeClr val="accent6">
+                    <a:lumMod val="75000"/>
+                  </a:schemeClr>
+                </a:solidFill>
+              </a:rPr>
+              <a:t>q</a:t>
+            </a:r>
+          </a:p>
+        </p:txBody>
+      </p:sp>
+    </p:spTree>
+    <p:extLst>
+      <p:ext uri="{BB962C8B-B14F-4D97-AF65-F5344CB8AC3E}">
+        <p14:creationId xmlns:p14="http://schemas.microsoft.com/office/powerpoint/2010/main" val="327592767"/>
+      </p:ext>
+    </p:extLst>
+  </p:cSld>
+  <p:clrMapOvr>
+    <a:masterClrMapping/>
+  </p:clrMapOvr>
+</p:sld>
+</file>
+
+<file path=ppt/slides/slide12.xml><?xml version="1.0" encoding="utf-8"?>
+<p:sld xmlns:a="http://schemas.openxmlformats.org/drawingml/2006/main" xmlns:r="http://schemas.openxmlformats.org/officeDocument/2006/relationships" xmlns:p="http://schemas.openxmlformats.org/presentationml/2006/main">
+  <p:cSld>
+    <p:spTree>
+      <p:nvGrpSpPr>
+        <p:cNvPr id="1" name=""/>
+        <p:cNvGrpSpPr/>
+        <p:nvPr/>
+      </p:nvGrpSpPr>
+      <p:grpSpPr>
+        <a:xfrm>
+          <a:off x="0" y="0"/>
+          <a:ext cx="0" cy="0"/>
+          <a:chOff x="0" y="0"/>
+          <a:chExt cx="0" cy="0"/>
+        </a:xfrm>
+      </p:grpSpPr>
+      <p:sp>
+        <p:nvSpPr>
+          <p:cNvPr id="2" name="Text Placeholder 1"/>
+          <p:cNvSpPr>
+            <a:spLocks noGrp="1"/>
+          </p:cNvSpPr>
+          <p:nvPr>
+            <p:ph type="body" sz="quarter" idx="10"/>
+          </p:nvPr>
+        </p:nvSpPr>
+        <p:spPr/>
+        <p:txBody>
+          <a:bodyPr/>
+          <a:lstStyle/>
+          <a:p>
+            <a:r>
+              <a:rPr lang="en-US" altLang="ko-KR" dirty="0" err="1"/>
+              <a:t>Definisi</a:t>
+            </a:r>
+            <a:endParaRPr lang="ko-KR" altLang="en-US" dirty="0"/>
+          </a:p>
+        </p:txBody>
+      </p:sp>
+      <p:sp>
+        <p:nvSpPr>
+          <p:cNvPr id="3" name="Text Placeholder 2"/>
+          <p:cNvSpPr>
+            <a:spLocks noGrp="1"/>
+          </p:cNvSpPr>
+          <p:nvPr>
+            <p:ph type="body" sz="quarter" idx="11"/>
+          </p:nvPr>
+        </p:nvSpPr>
+        <p:spPr/>
+        <p:txBody>
+          <a:bodyPr/>
+          <a:lstStyle/>
+          <a:p>
+            <a:pPr lvl="0"/>
+            <a:r>
+              <a:rPr lang="en-US" altLang="ko-KR" b="1" dirty="0" err="1"/>
+              <a:t>Jangkauan</a:t>
+            </a:r>
+            <a:r>
+              <a:rPr lang="en-US" altLang="ko-KR" b="1" dirty="0"/>
+              <a:t> </a:t>
+            </a:r>
+            <a:r>
+              <a:rPr lang="en-US" altLang="ko-KR" b="1" dirty="0" err="1"/>
+              <a:t>Persentil</a:t>
+            </a:r>
+            <a:endParaRPr lang="en-US" altLang="ko-KR" b="1" dirty="0"/>
+          </a:p>
+        </p:txBody>
+      </p:sp>
+      <p:sp>
+        <p:nvSpPr>
+          <p:cNvPr id="5" name="TextBox 4"/>
+          <p:cNvSpPr txBox="1"/>
+          <p:nvPr/>
+        </p:nvSpPr>
+        <p:spPr>
+          <a:xfrm>
+            <a:off x="4572000" y="1563638"/>
+            <a:ext cx="4176464" cy="584775"/>
+          </a:xfrm>
+          <a:prstGeom prst="rect">
+            <a:avLst/>
+          </a:prstGeom>
+          <a:noFill/>
+        </p:spPr>
+        <p:txBody>
+          <a:bodyPr wrap="square" rtlCol="0" anchor="ctr">
+            <a:spAutoFit/>
+          </a:bodyPr>
+          <a:lstStyle/>
+          <a:p>
+            <a:r>
+              <a:rPr lang="en-US" altLang="ko-KR" sz="1600" dirty="0" err="1">
+                <a:cs typeface="Arial" pitchFamily="34" charset="0"/>
+              </a:rPr>
+              <a:t>Sekumpulan</a:t>
+            </a:r>
+            <a:r>
+              <a:rPr lang="en-US" altLang="ko-KR" sz="1600" dirty="0">
+                <a:cs typeface="Arial" pitchFamily="34" charset="0"/>
+              </a:rPr>
+              <a:t> data yang </a:t>
+            </a:r>
+            <a:r>
+              <a:rPr lang="en-US" altLang="ko-KR" sz="1600" dirty="0" err="1">
+                <a:cs typeface="Arial" pitchFamily="34" charset="0"/>
+              </a:rPr>
+              <a:t>mempunyai</a:t>
+            </a:r>
+            <a:r>
+              <a:rPr lang="en-US" altLang="ko-KR" sz="1600" dirty="0">
+                <a:cs typeface="Arial" pitchFamily="34" charset="0"/>
+              </a:rPr>
+              <a:t> </a:t>
+            </a:r>
+            <a:r>
+              <a:rPr lang="en-US" altLang="ko-KR" sz="1600" dirty="0" err="1">
+                <a:cs typeface="Arial" pitchFamily="34" charset="0"/>
+              </a:rPr>
+              <a:t>persentil</a:t>
+            </a:r>
+            <a:r>
+              <a:rPr lang="en-US" altLang="ko-KR" sz="1600" dirty="0">
+                <a:cs typeface="Arial" pitchFamily="34" charset="0"/>
+              </a:rPr>
+              <a:t> </a:t>
+            </a:r>
+            <a:r>
+              <a:rPr lang="en-US" altLang="ko-KR" sz="1600" dirty="0" err="1">
+                <a:cs typeface="Arial" pitchFamily="34" charset="0"/>
+              </a:rPr>
+              <a:t>ke</a:t>
+            </a:r>
+            <a:r>
+              <a:rPr lang="en-US" altLang="ko-KR" sz="1600" dirty="0">
+                <a:cs typeface="Arial" pitchFamily="34" charset="0"/>
+              </a:rPr>
+              <a:t> – 10 dan </a:t>
+            </a:r>
+            <a:r>
+              <a:rPr lang="en-US" altLang="ko-KR" sz="1600" dirty="0" err="1">
+                <a:cs typeface="Arial" pitchFamily="34" charset="0"/>
+              </a:rPr>
+              <a:t>persentil</a:t>
+            </a:r>
+            <a:r>
+              <a:rPr lang="en-US" altLang="ko-KR" sz="1600" dirty="0">
+                <a:cs typeface="Arial" pitchFamily="34" charset="0"/>
+              </a:rPr>
+              <a:t> </a:t>
+            </a:r>
+            <a:r>
+              <a:rPr lang="en-US" altLang="ko-KR" sz="1600" dirty="0" err="1">
+                <a:cs typeface="Arial" pitchFamily="34" charset="0"/>
+              </a:rPr>
+              <a:t>ke</a:t>
+            </a:r>
+            <a:r>
+              <a:rPr lang="en-US" altLang="ko-KR" sz="1600" dirty="0">
+                <a:cs typeface="Arial" pitchFamily="34" charset="0"/>
+              </a:rPr>
+              <a:t> 90</a:t>
+            </a:r>
+          </a:p>
+        </p:txBody>
+      </p:sp>
+      <p:sp>
+        <p:nvSpPr>
+          <p:cNvPr id="8" name="TextBox 7">
+            <a:extLst>
+              <a:ext uri="{FF2B5EF4-FFF2-40B4-BE49-F238E27FC236}">
+                <a16:creationId xmlns:a16="http://schemas.microsoft.com/office/drawing/2014/main" id="{19611154-22EA-4008-B195-364F27E6F1C5}"/>
+              </a:ext>
+            </a:extLst>
+          </p:cNvPr>
+          <p:cNvSpPr txBox="1"/>
+          <p:nvPr/>
+        </p:nvSpPr>
+        <p:spPr>
+          <a:xfrm>
+            <a:off x="1043608" y="1221614"/>
+            <a:ext cx="2520280" cy="2215991"/>
+          </a:xfrm>
+          <a:prstGeom prst="rect">
+            <a:avLst/>
+          </a:prstGeom>
+          <a:noFill/>
+        </p:spPr>
+        <p:txBody>
+          <a:bodyPr wrap="square" rtlCol="0" anchor="ctr">
+            <a:spAutoFit/>
+          </a:bodyPr>
+          <a:lstStyle/>
+          <a:p>
+            <a:pPr algn="ctr"/>
+            <a:r>
+              <a:rPr lang="en-US" sz="13800" dirty="0">
+                <a:solidFill>
+                  <a:schemeClr val="accent6">
+                    <a:lumMod val="75000"/>
+                  </a:schemeClr>
+                </a:solidFill>
+              </a:rPr>
+              <a:t>JP</a:t>
+            </a:r>
+          </a:p>
+        </p:txBody>
+      </p:sp>
+      <p:pic>
+        <p:nvPicPr>
+          <p:cNvPr id="6" name="Picture 5">
+            <a:extLst>
+              <a:ext uri="{FF2B5EF4-FFF2-40B4-BE49-F238E27FC236}">
+                <a16:creationId xmlns:a16="http://schemas.microsoft.com/office/drawing/2014/main" id="{7DA1006D-8DCE-4AAE-AA32-363B71BB00B3}"/>
+              </a:ext>
+            </a:extLst>
+          </p:cNvPr>
+          <p:cNvPicPr>
+            <a:picLocks noChangeAspect="1"/>
+          </p:cNvPicPr>
+          <p:nvPr/>
+        </p:nvPicPr>
+        <p:blipFill>
+          <a:blip r:embed="rId2">
+            <a:clrChange>
+              <a:clrFrom>
+                <a:srgbClr val="FFFFFF"/>
+              </a:clrFrom>
+              <a:clrTo>
+                <a:srgbClr val="FFFFFF">
+                  <a:alpha val="0"/>
+                </a:srgbClr>
+              </a:clrTo>
+            </a:clrChange>
+          </a:blip>
+          <a:stretch>
+            <a:fillRect/>
+          </a:stretch>
+        </p:blipFill>
+        <p:spPr>
+          <a:xfrm>
+            <a:off x="4499992" y="2329610"/>
+            <a:ext cx="3292996" cy="800999"/>
+          </a:xfrm>
+          <a:prstGeom prst="rect">
+            <a:avLst/>
+          </a:prstGeom>
+        </p:spPr>
+      </p:pic>
+      <p:sp>
+        <p:nvSpPr>
+          <p:cNvPr id="9" name="TextBox 8">
+            <a:extLst>
+              <a:ext uri="{FF2B5EF4-FFF2-40B4-BE49-F238E27FC236}">
+                <a16:creationId xmlns:a16="http://schemas.microsoft.com/office/drawing/2014/main" id="{E79E9EAC-070F-4BFE-B17F-016E1000A71D}"/>
+              </a:ext>
+            </a:extLst>
+          </p:cNvPr>
+          <p:cNvSpPr txBox="1"/>
+          <p:nvPr/>
+        </p:nvSpPr>
+        <p:spPr>
+          <a:xfrm>
+            <a:off x="4572000" y="3276221"/>
+            <a:ext cx="4113410" cy="338554"/>
+          </a:xfrm>
+          <a:prstGeom prst="rect">
+            <a:avLst/>
+          </a:prstGeom>
+          <a:noFill/>
+        </p:spPr>
+        <p:txBody>
+          <a:bodyPr wrap="square" rtlCol="0" anchor="ctr">
+            <a:spAutoFit/>
+          </a:bodyPr>
+          <a:lstStyle/>
+          <a:p>
+            <a:pPr algn="just"/>
+            <a:r>
+              <a:rPr lang="en-US" sz="1600" dirty="0"/>
+              <a:t>JP = </a:t>
+            </a:r>
+            <a:r>
+              <a:rPr lang="en-US" sz="1600" dirty="0" err="1"/>
+              <a:t>Jangkauan</a:t>
+            </a:r>
+            <a:r>
+              <a:rPr lang="en-US" sz="1600" dirty="0"/>
+              <a:t> </a:t>
+            </a:r>
+            <a:r>
+              <a:rPr lang="en-US" sz="1600" dirty="0" err="1"/>
+              <a:t>Persentil</a:t>
+            </a:r>
+            <a:endParaRPr lang="en-US" altLang="ko-KR" sz="1600" dirty="0">
+              <a:solidFill>
+                <a:schemeClr val="tx1">
+                  <a:lumMod val="75000"/>
+                  <a:lumOff val="25000"/>
+                </a:schemeClr>
+              </a:solidFill>
+              <a:cs typeface="Arial" pitchFamily="34" charset="0"/>
+            </a:endParaRPr>
+          </a:p>
+        </p:txBody>
+      </p:sp>
+      <p:sp>
+        <p:nvSpPr>
+          <p:cNvPr id="12" name="TextBox 11">
+            <a:extLst>
+              <a:ext uri="{FF2B5EF4-FFF2-40B4-BE49-F238E27FC236}">
+                <a16:creationId xmlns:a16="http://schemas.microsoft.com/office/drawing/2014/main" id="{7ACD0EC8-9D3A-4B4F-8492-7AC0C75785A6}"/>
+              </a:ext>
+            </a:extLst>
+          </p:cNvPr>
+          <p:cNvSpPr txBox="1"/>
+          <p:nvPr/>
+        </p:nvSpPr>
+        <p:spPr>
+          <a:xfrm>
+            <a:off x="4572000" y="3735583"/>
+            <a:ext cx="4113410" cy="338554"/>
+          </a:xfrm>
+          <a:prstGeom prst="rect">
+            <a:avLst/>
+          </a:prstGeom>
+          <a:noFill/>
+        </p:spPr>
+        <p:txBody>
+          <a:bodyPr wrap="square" rtlCol="0" anchor="ctr">
+            <a:spAutoFit/>
+          </a:bodyPr>
+          <a:lstStyle/>
+          <a:p>
+            <a:pPr algn="just"/>
+            <a:r>
+              <a:rPr lang="en-US" sz="1600" dirty="0"/>
+              <a:t>P10 = </a:t>
+            </a:r>
+            <a:r>
+              <a:rPr lang="en-US" sz="1600" dirty="0" err="1"/>
+              <a:t>persentil</a:t>
+            </a:r>
+            <a:r>
+              <a:rPr lang="en-US" sz="1600" dirty="0"/>
+              <a:t> </a:t>
+            </a:r>
+            <a:r>
+              <a:rPr lang="en-US" sz="1600" dirty="0" err="1"/>
+              <a:t>ke</a:t>
+            </a:r>
+            <a:r>
+              <a:rPr lang="en-US" sz="1600" dirty="0"/>
+              <a:t> 10</a:t>
+            </a:r>
+            <a:endParaRPr lang="en-US" altLang="ko-KR" sz="1600" dirty="0">
+              <a:solidFill>
+                <a:schemeClr val="tx1">
+                  <a:lumMod val="75000"/>
+                  <a:lumOff val="25000"/>
+                </a:schemeClr>
+              </a:solidFill>
+              <a:cs typeface="Arial" pitchFamily="34" charset="0"/>
+            </a:endParaRPr>
+          </a:p>
+        </p:txBody>
+      </p:sp>
+      <p:sp>
+        <p:nvSpPr>
+          <p:cNvPr id="13" name="TextBox 12">
+            <a:extLst>
+              <a:ext uri="{FF2B5EF4-FFF2-40B4-BE49-F238E27FC236}">
+                <a16:creationId xmlns:a16="http://schemas.microsoft.com/office/drawing/2014/main" id="{BE27B4D7-2B95-4CFD-BC48-57A0341B12E6}"/>
+              </a:ext>
+            </a:extLst>
+          </p:cNvPr>
+          <p:cNvSpPr txBox="1"/>
+          <p:nvPr/>
+        </p:nvSpPr>
+        <p:spPr>
+          <a:xfrm>
+            <a:off x="4572000" y="4194945"/>
+            <a:ext cx="4113410" cy="338554"/>
+          </a:xfrm>
+          <a:prstGeom prst="rect">
+            <a:avLst/>
+          </a:prstGeom>
+          <a:noFill/>
+        </p:spPr>
+        <p:txBody>
+          <a:bodyPr wrap="square" rtlCol="0" anchor="ctr">
+            <a:spAutoFit/>
+          </a:bodyPr>
+          <a:lstStyle/>
+          <a:p>
+            <a:pPr algn="just"/>
+            <a:r>
+              <a:rPr lang="en-US" sz="1600" dirty="0"/>
+              <a:t>P90 = </a:t>
+            </a:r>
+            <a:r>
+              <a:rPr lang="en-US" sz="1600" dirty="0" err="1"/>
+              <a:t>persentil</a:t>
+            </a:r>
+            <a:r>
+              <a:rPr lang="en-US" sz="1600" dirty="0"/>
+              <a:t> </a:t>
+            </a:r>
+            <a:r>
+              <a:rPr lang="en-US" sz="1600" dirty="0" err="1"/>
+              <a:t>ke</a:t>
+            </a:r>
+            <a:r>
+              <a:rPr lang="en-US" sz="1600" dirty="0"/>
+              <a:t> 90</a:t>
+            </a:r>
+            <a:endParaRPr lang="en-US" altLang="ko-KR" sz="1600" dirty="0">
+              <a:solidFill>
+                <a:schemeClr val="tx1">
+                  <a:lumMod val="75000"/>
+                  <a:lumOff val="25000"/>
+                </a:schemeClr>
+              </a:solidFill>
+              <a:cs typeface="Arial" pitchFamily="34" charset="0"/>
+            </a:endParaRPr>
+          </a:p>
+        </p:txBody>
+      </p:sp>
+    </p:spTree>
+    <p:extLst>
+      <p:ext uri="{BB962C8B-B14F-4D97-AF65-F5344CB8AC3E}">
+        <p14:creationId xmlns:p14="http://schemas.microsoft.com/office/powerpoint/2010/main" val="3946867494"/>
+      </p:ext>
+    </p:extLst>
+  </p:cSld>
+  <p:clrMapOvr>
+    <a:masterClrMapping/>
+  </p:clrMapOvr>
+</p:sld>
+</file>
+
+<file path=ppt/slides/slide13.xml><?xml version="1.0" encoding="utf-8"?>
+<p:sld xmlns:a="http://schemas.openxmlformats.org/drawingml/2006/main" xmlns:r="http://schemas.openxmlformats.org/officeDocument/2006/relationships" xmlns:p="http://schemas.openxmlformats.org/presentationml/2006/main">
+  <p:cSld>
+    <p:spTree>
+      <p:nvGrpSpPr>
+        <p:cNvPr id="1" name=""/>
+        <p:cNvGrpSpPr/>
+        <p:nvPr/>
+      </p:nvGrpSpPr>
+      <p:grpSpPr>
+        <a:xfrm>
+          <a:off x="0" y="0"/>
+          <a:ext cx="0" cy="0"/>
+          <a:chOff x="0" y="0"/>
+          <a:chExt cx="0" cy="0"/>
+        </a:xfrm>
+      </p:grpSpPr>
+      <p:sp>
+        <p:nvSpPr>
+          <p:cNvPr id="2" name="Text Placeholder 1"/>
+          <p:cNvSpPr>
+            <a:spLocks noGrp="1"/>
+          </p:cNvSpPr>
+          <p:nvPr>
+            <p:ph type="body" sz="quarter" idx="10"/>
+          </p:nvPr>
+        </p:nvSpPr>
+        <p:spPr/>
+        <p:txBody>
+          <a:bodyPr/>
+          <a:lstStyle/>
+          <a:p>
+            <a:r>
+              <a:rPr lang="en-US" altLang="ko-KR" dirty="0" err="1"/>
+              <a:t>Studi</a:t>
+            </a:r>
+            <a:r>
+              <a:rPr lang="en-US" altLang="ko-KR" dirty="0"/>
+              <a:t> </a:t>
+            </a:r>
+            <a:r>
+              <a:rPr lang="en-US" altLang="ko-KR" dirty="0" err="1"/>
+              <a:t>Kasus</a:t>
+            </a:r>
+            <a:endParaRPr lang="ko-KR" altLang="en-US" dirty="0"/>
+          </a:p>
+        </p:txBody>
+      </p:sp>
+      <p:sp>
+        <p:nvSpPr>
+          <p:cNvPr id="3" name="Text Placeholder 2"/>
+          <p:cNvSpPr>
+            <a:spLocks noGrp="1"/>
+          </p:cNvSpPr>
+          <p:nvPr>
+            <p:ph type="body" sz="quarter" idx="11"/>
+          </p:nvPr>
+        </p:nvSpPr>
+        <p:spPr/>
+        <p:txBody>
+          <a:bodyPr/>
+          <a:lstStyle/>
+          <a:p>
+            <a:pPr lvl="0"/>
+            <a:r>
+              <a:rPr lang="en-US" b="1" dirty="0" err="1"/>
+              <a:t>Tabel</a:t>
+            </a:r>
+            <a:r>
+              <a:rPr lang="en-US" b="1" dirty="0"/>
+              <a:t> data </a:t>
+            </a:r>
+            <a:r>
+              <a:rPr lang="en-US" b="1" dirty="0" err="1"/>
+              <a:t>nilai</a:t>
+            </a:r>
+            <a:r>
+              <a:rPr lang="en-US" b="1" dirty="0"/>
+              <a:t> </a:t>
+            </a:r>
+            <a:r>
+              <a:rPr lang="en-US" b="1" dirty="0" err="1"/>
+              <a:t>ujian</a:t>
+            </a:r>
+            <a:r>
+              <a:rPr lang="en-US" b="1" dirty="0"/>
+              <a:t> Pelajaran Agama Islam 50 </a:t>
+            </a:r>
+            <a:r>
+              <a:rPr lang="en-US" b="1" dirty="0" err="1"/>
+              <a:t>Siswa</a:t>
+            </a:r>
+            <a:endParaRPr lang="en-US" altLang="ko-KR" b="1" dirty="0"/>
+          </a:p>
+        </p:txBody>
+      </p:sp>
+      <p:pic>
+        <p:nvPicPr>
+          <p:cNvPr id="4" name="Picture 3">
+            <a:extLst>
+              <a:ext uri="{FF2B5EF4-FFF2-40B4-BE49-F238E27FC236}">
+                <a16:creationId xmlns:a16="http://schemas.microsoft.com/office/drawing/2014/main" id="{865C2D9A-23C4-4247-A4D4-9D820795B3E2}"/>
+              </a:ext>
+            </a:extLst>
+          </p:cNvPr>
+          <p:cNvPicPr>
+            <a:picLocks noChangeAspect="1"/>
+          </p:cNvPicPr>
+          <p:nvPr/>
+        </p:nvPicPr>
+        <p:blipFill rotWithShape="1">
+          <a:blip r:embed="rId2"/>
+          <a:srcRect t="9999"/>
+          <a:stretch/>
+        </p:blipFill>
+        <p:spPr>
+          <a:xfrm>
+            <a:off x="827584" y="2283718"/>
+            <a:ext cx="7725562" cy="1296343"/>
+          </a:xfrm>
+          <a:prstGeom prst="rect">
+            <a:avLst/>
+          </a:prstGeom>
+        </p:spPr>
+      </p:pic>
+    </p:spTree>
+    <p:extLst>
+      <p:ext uri="{BB962C8B-B14F-4D97-AF65-F5344CB8AC3E}">
+        <p14:creationId xmlns:p14="http://schemas.microsoft.com/office/powerpoint/2010/main" val="3881987988"/>
       </p:ext>
     </p:extLst>
   </p:cSld>
@@ -10830,7 +12049,7 @@
         </p:nvSpPr>
         <p:spPr>
           <a:xfrm>
-            <a:off x="4427984" y="2279362"/>
+            <a:off x="4427984" y="1707654"/>
             <a:ext cx="4320480" cy="584775"/>
           </a:xfrm>
           <a:prstGeom prst="rect">
@@ -11049,7 +12268,7 @@
         </p:nvSpPr>
         <p:spPr>
           <a:xfrm>
-            <a:off x="4427984" y="3198916"/>
+            <a:off x="4444078" y="2632012"/>
             <a:ext cx="4320480" cy="338554"/>
           </a:xfrm>
           <a:prstGeom prst="rect">
@@ -11106,7 +12325,7 @@
         </p:nvSpPr>
         <p:spPr>
           <a:xfrm>
-            <a:off x="4422889" y="3595250"/>
+            <a:off x="4444078" y="3076518"/>
             <a:ext cx="4613607" cy="276999"/>
           </a:xfrm>
           <a:prstGeom prst="rect">
@@ -11147,7 +12366,7 @@
         </p:nvSpPr>
         <p:spPr>
           <a:xfrm>
-            <a:off x="4422888" y="3930029"/>
+            <a:off x="4444078" y="3493335"/>
             <a:ext cx="4613607" cy="276999"/>
           </a:xfrm>
           <a:prstGeom prst="rect">
@@ -12371,6 +13590,253 @@
               <a:t>/</a:t>
             </a:r>
             <a:endParaRPr lang="en-US" sz="2000" dirty="0"/>
+          </a:p>
+        </p:txBody>
+      </p:sp>
+      <p:sp>
+        <p:nvSpPr>
+          <p:cNvPr id="4" name="Arrow: Up 3">
+            <a:extLst>
+              <a:ext uri="{FF2B5EF4-FFF2-40B4-BE49-F238E27FC236}">
+                <a16:creationId xmlns:a16="http://schemas.microsoft.com/office/drawing/2014/main" id="{7C51D6B2-15B9-41CE-8556-88993D93ECF3}"/>
+              </a:ext>
+            </a:extLst>
+          </p:cNvPr>
+          <p:cNvSpPr/>
+          <p:nvPr/>
+        </p:nvSpPr>
+        <p:spPr>
+          <a:xfrm>
+            <a:off x="1130125" y="1707654"/>
+            <a:ext cx="288032" cy="288032"/>
+          </a:xfrm>
+          <a:prstGeom prst="upArrow">
+            <a:avLst/>
+          </a:prstGeom>
+        </p:spPr>
+        <p:style>
+          <a:lnRef idx="2">
+            <a:schemeClr val="accent1">
+              <a:shade val="50000"/>
+            </a:schemeClr>
+          </a:lnRef>
+          <a:fillRef idx="1">
+            <a:schemeClr val="accent1"/>
+          </a:fillRef>
+          <a:effectRef idx="0">
+            <a:schemeClr val="accent1"/>
+          </a:effectRef>
+          <a:fontRef idx="minor">
+            <a:schemeClr val="lt1"/>
+          </a:fontRef>
+        </p:style>
+        <p:txBody>
+          <a:bodyPr rtlCol="0" anchor="ctr"/>
+          <a:lstStyle/>
+          <a:p>
+            <a:pPr algn="ctr"/>
+            <a:endParaRPr lang="en-US"/>
+          </a:p>
+        </p:txBody>
+      </p:sp>
+      <p:sp>
+        <p:nvSpPr>
+          <p:cNvPr id="6" name="TextBox 5">
+            <a:extLst>
+              <a:ext uri="{FF2B5EF4-FFF2-40B4-BE49-F238E27FC236}">
+                <a16:creationId xmlns:a16="http://schemas.microsoft.com/office/drawing/2014/main" id="{6DF2F536-5734-46CC-85E8-FDF1D9D9D4FD}"/>
+              </a:ext>
+            </a:extLst>
+          </p:cNvPr>
+          <p:cNvSpPr txBox="1"/>
+          <p:nvPr/>
+        </p:nvSpPr>
+        <p:spPr>
+          <a:xfrm>
+            <a:off x="307746" y="1281080"/>
+            <a:ext cx="2074350" cy="307777"/>
+          </a:xfrm>
+          <a:prstGeom prst="rect">
+            <a:avLst/>
+          </a:prstGeom>
+          <a:noFill/>
+        </p:spPr>
+        <p:txBody>
+          <a:bodyPr wrap="none" rtlCol="0">
+            <a:spAutoFit/>
+          </a:bodyPr>
+          <a:lstStyle/>
+          <a:p>
+            <a:r>
+              <a:rPr lang="en-US" sz="1400" b="1" dirty="0" err="1">
+                <a:solidFill>
+                  <a:srgbClr val="85D8DE"/>
+                </a:solidFill>
+              </a:rPr>
+              <a:t>Variansi</a:t>
+            </a:r>
+            <a:r>
+              <a:rPr lang="en-US" sz="1400" b="1" dirty="0">
+                <a:solidFill>
+                  <a:srgbClr val="85D8DE"/>
+                </a:solidFill>
+              </a:rPr>
+              <a:t> </a:t>
+            </a:r>
+            <a:r>
+              <a:rPr lang="en-US" sz="1400" b="1" dirty="0" err="1">
+                <a:solidFill>
+                  <a:srgbClr val="85D8DE"/>
+                </a:solidFill>
+              </a:rPr>
+              <a:t>untuk</a:t>
+            </a:r>
+            <a:r>
+              <a:rPr lang="en-US" sz="1400" b="1" dirty="0">
+                <a:solidFill>
+                  <a:srgbClr val="85D8DE"/>
+                </a:solidFill>
+              </a:rPr>
+              <a:t> </a:t>
+            </a:r>
+            <a:r>
+              <a:rPr lang="en-US" sz="1400" b="1" dirty="0" err="1">
+                <a:solidFill>
+                  <a:srgbClr val="85D8DE"/>
+                </a:solidFill>
+              </a:rPr>
+              <a:t>sampel</a:t>
+            </a:r>
+            <a:endParaRPr lang="en-US" sz="1400" b="1" dirty="0">
+              <a:solidFill>
+                <a:srgbClr val="85D8DE"/>
+              </a:solidFill>
+            </a:endParaRPr>
+          </a:p>
+        </p:txBody>
+      </p:sp>
+      <p:sp>
+        <p:nvSpPr>
+          <p:cNvPr id="10" name="Arrow: Down 9">
+            <a:extLst>
+              <a:ext uri="{FF2B5EF4-FFF2-40B4-BE49-F238E27FC236}">
+                <a16:creationId xmlns:a16="http://schemas.microsoft.com/office/drawing/2014/main" id="{A5332424-1A5B-4CDD-B02C-0F439C593F27}"/>
+              </a:ext>
+            </a:extLst>
+          </p:cNvPr>
+          <p:cNvSpPr/>
+          <p:nvPr/>
+        </p:nvSpPr>
+        <p:spPr>
+          <a:xfrm>
+            <a:off x="3549422" y="3473407"/>
+            <a:ext cx="288032" cy="288032"/>
+          </a:xfrm>
+          <a:prstGeom prst="downArrow">
+            <a:avLst/>
+          </a:prstGeom>
+          <a:solidFill>
+            <a:srgbClr val="9CE084"/>
+          </a:solidFill>
+        </p:spPr>
+        <p:style>
+          <a:lnRef idx="2">
+            <a:schemeClr val="accent1">
+              <a:shade val="50000"/>
+            </a:schemeClr>
+          </a:lnRef>
+          <a:fillRef idx="1">
+            <a:schemeClr val="accent1"/>
+          </a:fillRef>
+          <a:effectRef idx="0">
+            <a:schemeClr val="accent1"/>
+          </a:effectRef>
+          <a:fontRef idx="minor">
+            <a:schemeClr val="lt1"/>
+          </a:fontRef>
+        </p:style>
+        <p:txBody>
+          <a:bodyPr rtlCol="0" anchor="ctr"/>
+          <a:lstStyle/>
+          <a:p>
+            <a:pPr algn="ctr"/>
+            <a:endParaRPr lang="en-US"/>
+          </a:p>
+        </p:txBody>
+      </p:sp>
+      <p:sp>
+        <p:nvSpPr>
+          <p:cNvPr id="11" name="TextBox 10">
+            <a:extLst>
+              <a:ext uri="{FF2B5EF4-FFF2-40B4-BE49-F238E27FC236}">
+                <a16:creationId xmlns:a16="http://schemas.microsoft.com/office/drawing/2014/main" id="{9E3E67BF-7559-457A-A7F4-69FBC695EA21}"/>
+              </a:ext>
+            </a:extLst>
+          </p:cNvPr>
+          <p:cNvSpPr txBox="1"/>
+          <p:nvPr/>
+        </p:nvSpPr>
+        <p:spPr>
+          <a:xfrm>
+            <a:off x="2656263" y="3794624"/>
+            <a:ext cx="2074350" cy="307777"/>
+          </a:xfrm>
+          <a:prstGeom prst="rect">
+            <a:avLst/>
+          </a:prstGeom>
+          <a:noFill/>
+        </p:spPr>
+        <p:txBody>
+          <a:bodyPr wrap="none" rtlCol="0">
+            <a:spAutoFit/>
+          </a:bodyPr>
+          <a:lstStyle/>
+          <a:p>
+            <a:r>
+              <a:rPr lang="en-US" sz="1400" b="1" dirty="0" err="1">
+                <a:solidFill>
+                  <a:srgbClr val="9CE084"/>
+                </a:solidFill>
+              </a:rPr>
+              <a:t>Variansi</a:t>
+            </a:r>
+            <a:r>
+              <a:rPr lang="en-US" sz="1400" b="1" dirty="0">
+                <a:solidFill>
+                  <a:srgbClr val="9CE084"/>
+                </a:solidFill>
+              </a:rPr>
+              <a:t> </a:t>
+            </a:r>
+            <a:r>
+              <a:rPr lang="en-US" sz="1400" b="1" dirty="0" err="1">
+                <a:solidFill>
+                  <a:srgbClr val="9CE084"/>
+                </a:solidFill>
+              </a:rPr>
+              <a:t>untuk</a:t>
+            </a:r>
+            <a:r>
+              <a:rPr lang="en-US" sz="1400" b="1" dirty="0">
+                <a:solidFill>
+                  <a:srgbClr val="9CE084"/>
+                </a:solidFill>
+              </a:rPr>
+              <a:t> </a:t>
+            </a:r>
+            <a:r>
+              <a:rPr lang="en-US" sz="1400" b="1" dirty="0" err="1">
+                <a:solidFill>
+                  <a:srgbClr val="9CE084"/>
+                </a:solidFill>
+              </a:rPr>
+              <a:t>sampel</a:t>
+            </a:r>
+            <a:endParaRPr lang="en-US" sz="1400" b="1" dirty="0">
+              <a:solidFill>
+                <a:srgbClr val="9CE084"/>
+              </a:solidFill>
+            </a:endParaRPr>
           </a:p>
         </p:txBody>
       </p:sp>

</xml_diff>

<commit_message>
Excel dan Powerpoint update again
</commit_message>
<xml_diff>
--- a/Presentasi-Statistika-kelompok-3.pptx
+++ b/Presentasi-Statistika-kelompok-3.pptx
@@ -7,7 +7,7 @@
     <p:sldMasterId id="2147483653" r:id="rId3"/>
   </p:sldMasterIdLst>
   <p:notesMasterIdLst>
-    <p:notesMasterId r:id="rId17"/>
+    <p:notesMasterId r:id="rId21"/>
   </p:notesMasterIdLst>
   <p:sldIdLst>
     <p:sldId id="256" r:id="rId4"/>
@@ -23,6 +23,10 @@
     <p:sldId id="302" r:id="rId14"/>
     <p:sldId id="303" r:id="rId15"/>
     <p:sldId id="304" r:id="rId16"/>
+    <p:sldId id="305" r:id="rId17"/>
+    <p:sldId id="306" r:id="rId18"/>
+    <p:sldId id="307" r:id="rId19"/>
+    <p:sldId id="308" r:id="rId20"/>
   </p:sldIdLst>
   <p:sldSz cx="9144000" cy="5143500" type="screen16x9"/>
   <p:notesSz cx="6858000" cy="9144000"/>
@@ -5612,7 +5616,7 @@
         </p:nvSpPr>
         <p:spPr>
           <a:xfrm>
-            <a:off x="4572000" y="1563638"/>
+            <a:off x="3995936" y="1563638"/>
             <a:ext cx="4176464" cy="584775"/>
           </a:xfrm>
           <a:prstGeom prst="rect">
@@ -5795,8 +5799,8 @@
         </p:blipFill>
         <p:spPr>
           <a:xfrm>
-            <a:off x="4644008" y="2300982"/>
-            <a:ext cx="3194868" cy="1198782"/>
+            <a:off x="4054687" y="2395696"/>
+            <a:ext cx="4115453" cy="1544205"/>
           </a:xfrm>
           <a:prstGeom prst="rect">
             <a:avLst/>
@@ -6427,10 +6431,2990 @@
           </a:prstGeom>
         </p:spPr>
       </p:pic>
+      <p:sp>
+        <p:nvSpPr>
+          <p:cNvPr id="11" name="TextBox 10">
+            <a:extLst>
+              <a:ext uri="{FF2B5EF4-FFF2-40B4-BE49-F238E27FC236}">
+                <a16:creationId xmlns:a16="http://schemas.microsoft.com/office/drawing/2014/main" id="{E07A1541-4CD8-4EC6-8EE5-D91E55D9BF1D}"/>
+              </a:ext>
+            </a:extLst>
+          </p:cNvPr>
+          <p:cNvSpPr txBox="1"/>
+          <p:nvPr/>
+        </p:nvSpPr>
+        <p:spPr>
+          <a:xfrm>
+            <a:off x="827584" y="1563638"/>
+            <a:ext cx="4113410" cy="338554"/>
+          </a:xfrm>
+          <a:prstGeom prst="rect">
+            <a:avLst/>
+          </a:prstGeom>
+          <a:noFill/>
+        </p:spPr>
+        <p:txBody>
+          <a:bodyPr wrap="square" rtlCol="0" anchor="ctr">
+            <a:spAutoFit/>
+          </a:bodyPr>
+          <a:lstStyle/>
+          <a:p>
+            <a:pPr algn="just"/>
+            <a:r>
+              <a:rPr lang="en-US" sz="1600" dirty="0">
+                <a:sym typeface="Wingdings" panose="05000000000000000000" pitchFamily="2" charset="2"/>
+              </a:rPr>
+              <a:t> </a:t>
+            </a:r>
+            <a:r>
+              <a:rPr lang="en-US" sz="1600" dirty="0"/>
+              <a:t>Data </a:t>
+            </a:r>
+            <a:r>
+              <a:rPr lang="en-US" sz="1600" dirty="0" err="1"/>
+              <a:t>acak</a:t>
+            </a:r>
+            <a:endParaRPr lang="en-US" altLang="ko-KR" sz="1600" dirty="0">
+              <a:solidFill>
+                <a:schemeClr val="tx1">
+                  <a:lumMod val="75000"/>
+                  <a:lumOff val="25000"/>
+                </a:schemeClr>
+              </a:solidFill>
+              <a:cs typeface="Arial" pitchFamily="34" charset="0"/>
+            </a:endParaRPr>
+          </a:p>
+        </p:txBody>
+      </p:sp>
     </p:spTree>
     <p:extLst>
       <p:ext uri="{BB962C8B-B14F-4D97-AF65-F5344CB8AC3E}">
         <p14:creationId xmlns:p14="http://schemas.microsoft.com/office/powerpoint/2010/main" val="3881987988"/>
+      </p:ext>
+    </p:extLst>
+  </p:cSld>
+  <p:clrMapOvr>
+    <a:masterClrMapping/>
+  </p:clrMapOvr>
+</p:sld>
+</file>
+
+<file path=ppt/slides/slide14.xml><?xml version="1.0" encoding="utf-8"?>
+<p:sld xmlns:a="http://schemas.openxmlformats.org/drawingml/2006/main" xmlns:r="http://schemas.openxmlformats.org/officeDocument/2006/relationships" xmlns:p="http://schemas.openxmlformats.org/presentationml/2006/main">
+  <p:cSld>
+    <p:spTree>
+      <p:nvGrpSpPr>
+        <p:cNvPr id="1" name=""/>
+        <p:cNvGrpSpPr/>
+        <p:nvPr/>
+      </p:nvGrpSpPr>
+      <p:grpSpPr>
+        <a:xfrm>
+          <a:off x="0" y="0"/>
+          <a:ext cx="0" cy="0"/>
+          <a:chOff x="0" y="0"/>
+          <a:chExt cx="0" cy="0"/>
+        </a:xfrm>
+      </p:grpSpPr>
+      <p:sp>
+        <p:nvSpPr>
+          <p:cNvPr id="2" name="Text Placeholder 1"/>
+          <p:cNvSpPr>
+            <a:spLocks noGrp="1"/>
+          </p:cNvSpPr>
+          <p:nvPr>
+            <p:ph type="body" sz="quarter" idx="10"/>
+          </p:nvPr>
+        </p:nvSpPr>
+        <p:spPr/>
+        <p:txBody>
+          <a:bodyPr/>
+          <a:lstStyle/>
+          <a:p>
+            <a:r>
+              <a:rPr lang="en-US" altLang="ko-KR" dirty="0" err="1"/>
+              <a:t>Studi</a:t>
+            </a:r>
+            <a:r>
+              <a:rPr lang="en-US" altLang="ko-KR" dirty="0"/>
+              <a:t> </a:t>
+            </a:r>
+            <a:r>
+              <a:rPr lang="en-US" altLang="ko-KR" dirty="0" err="1"/>
+              <a:t>Kasus</a:t>
+            </a:r>
+            <a:endParaRPr lang="ko-KR" altLang="en-US" dirty="0"/>
+          </a:p>
+        </p:txBody>
+      </p:sp>
+      <p:sp>
+        <p:nvSpPr>
+          <p:cNvPr id="3" name="Text Placeholder 2"/>
+          <p:cNvSpPr>
+            <a:spLocks noGrp="1"/>
+          </p:cNvSpPr>
+          <p:nvPr>
+            <p:ph type="body" sz="quarter" idx="11"/>
+          </p:nvPr>
+        </p:nvSpPr>
+        <p:spPr/>
+        <p:txBody>
+          <a:bodyPr/>
+          <a:lstStyle/>
+          <a:p>
+            <a:pPr lvl="0"/>
+            <a:r>
+              <a:rPr lang="en-US" b="1" dirty="0" err="1"/>
+              <a:t>Tabel</a:t>
+            </a:r>
+            <a:r>
+              <a:rPr lang="en-US" b="1" dirty="0"/>
+              <a:t> data </a:t>
+            </a:r>
+            <a:r>
+              <a:rPr lang="en-US" b="1" dirty="0" err="1"/>
+              <a:t>nilai</a:t>
+            </a:r>
+            <a:r>
+              <a:rPr lang="en-US" b="1" dirty="0"/>
+              <a:t> </a:t>
+            </a:r>
+            <a:r>
+              <a:rPr lang="en-US" b="1" dirty="0" err="1"/>
+              <a:t>ujian</a:t>
+            </a:r>
+            <a:r>
+              <a:rPr lang="en-US" b="1" dirty="0"/>
+              <a:t> Pelajaran Agama Islam 50 </a:t>
+            </a:r>
+            <a:r>
+              <a:rPr lang="en-US" b="1" dirty="0" err="1"/>
+              <a:t>Siswa</a:t>
+            </a:r>
+            <a:endParaRPr lang="en-US" altLang="ko-KR" b="1" dirty="0"/>
+          </a:p>
+        </p:txBody>
+      </p:sp>
+      <p:sp>
+        <p:nvSpPr>
+          <p:cNvPr id="11" name="TextBox 10">
+            <a:extLst>
+              <a:ext uri="{FF2B5EF4-FFF2-40B4-BE49-F238E27FC236}">
+                <a16:creationId xmlns:a16="http://schemas.microsoft.com/office/drawing/2014/main" id="{E07A1541-4CD8-4EC6-8EE5-D91E55D9BF1D}"/>
+              </a:ext>
+            </a:extLst>
+          </p:cNvPr>
+          <p:cNvSpPr txBox="1"/>
+          <p:nvPr/>
+        </p:nvSpPr>
+        <p:spPr>
+          <a:xfrm>
+            <a:off x="827584" y="1563638"/>
+            <a:ext cx="4113410" cy="338554"/>
+          </a:xfrm>
+          <a:prstGeom prst="rect">
+            <a:avLst/>
+          </a:prstGeom>
+          <a:noFill/>
+        </p:spPr>
+        <p:txBody>
+          <a:bodyPr wrap="square" rtlCol="0" anchor="ctr">
+            <a:spAutoFit/>
+          </a:bodyPr>
+          <a:lstStyle/>
+          <a:p>
+            <a:pPr algn="just"/>
+            <a:r>
+              <a:rPr lang="en-US" sz="1600" dirty="0">
+                <a:sym typeface="Wingdings" panose="05000000000000000000" pitchFamily="2" charset="2"/>
+              </a:rPr>
+              <a:t> </a:t>
+            </a:r>
+            <a:r>
+              <a:rPr lang="en-US" sz="1600" dirty="0"/>
+              <a:t>Data </a:t>
+            </a:r>
+            <a:r>
+              <a:rPr lang="en-US" sz="1600" dirty="0" err="1"/>
+              <a:t>setelah</a:t>
+            </a:r>
+            <a:r>
+              <a:rPr lang="en-US" sz="1600" dirty="0"/>
+              <a:t> </a:t>
+            </a:r>
+            <a:r>
+              <a:rPr lang="en-US" sz="1600" dirty="0" err="1"/>
+              <a:t>diurut</a:t>
+            </a:r>
+            <a:endParaRPr lang="en-US" altLang="ko-KR" sz="1600" dirty="0">
+              <a:solidFill>
+                <a:schemeClr val="tx1">
+                  <a:lumMod val="75000"/>
+                  <a:lumOff val="25000"/>
+                </a:schemeClr>
+              </a:solidFill>
+              <a:cs typeface="Arial" pitchFamily="34" charset="0"/>
+            </a:endParaRPr>
+          </a:p>
+        </p:txBody>
+      </p:sp>
+      <p:graphicFrame>
+        <p:nvGraphicFramePr>
+          <p:cNvPr id="6" name="Table 5">
+            <a:extLst>
+              <a:ext uri="{FF2B5EF4-FFF2-40B4-BE49-F238E27FC236}">
+                <a16:creationId xmlns:a16="http://schemas.microsoft.com/office/drawing/2014/main" id="{DAB68DA4-648E-4F4A-802C-6C0D96A838DE}"/>
+              </a:ext>
+            </a:extLst>
+          </p:cNvPr>
+          <p:cNvGraphicFramePr>
+            <a:graphicFrameLocks noGrp="1"/>
+          </p:cNvGraphicFramePr>
+          <p:nvPr>
+            <p:extLst>
+              <p:ext uri="{D42A27DB-BD31-4B8C-83A1-F6EECF244321}">
+                <p14:modId xmlns:p14="http://schemas.microsoft.com/office/powerpoint/2010/main" val="3858224864"/>
+              </p:ext>
+            </p:extLst>
+          </p:nvPr>
+        </p:nvGraphicFramePr>
+        <p:xfrm>
+          <a:off x="1524000" y="2095500"/>
+          <a:ext cx="6096000" cy="1844400"/>
+        </p:xfrm>
+        <a:graphic>
+          <a:graphicData uri="http://schemas.openxmlformats.org/drawingml/2006/table">
+            <a:tbl>
+              <a:tblPr>
+                <a:tableStyleId>{793D81CF-94F2-401A-BA57-92F5A7B2D0C5}</a:tableStyleId>
+              </a:tblPr>
+              <a:tblGrid>
+                <a:gridCol w="609600">
+                  <a:extLst>
+                    <a:ext uri="{9D8B030D-6E8A-4147-A177-3AD203B41FA5}">
+                      <a16:colId xmlns:a16="http://schemas.microsoft.com/office/drawing/2014/main" val="798955445"/>
+                    </a:ext>
+                  </a:extLst>
+                </a:gridCol>
+                <a:gridCol w="609600">
+                  <a:extLst>
+                    <a:ext uri="{9D8B030D-6E8A-4147-A177-3AD203B41FA5}">
+                      <a16:colId xmlns:a16="http://schemas.microsoft.com/office/drawing/2014/main" val="2542046601"/>
+                    </a:ext>
+                  </a:extLst>
+                </a:gridCol>
+                <a:gridCol w="609600">
+                  <a:extLst>
+                    <a:ext uri="{9D8B030D-6E8A-4147-A177-3AD203B41FA5}">
+                      <a16:colId xmlns:a16="http://schemas.microsoft.com/office/drawing/2014/main" val="2883744322"/>
+                    </a:ext>
+                  </a:extLst>
+                </a:gridCol>
+                <a:gridCol w="609600">
+                  <a:extLst>
+                    <a:ext uri="{9D8B030D-6E8A-4147-A177-3AD203B41FA5}">
+                      <a16:colId xmlns:a16="http://schemas.microsoft.com/office/drawing/2014/main" val="4171744033"/>
+                    </a:ext>
+                  </a:extLst>
+                </a:gridCol>
+                <a:gridCol w="609600">
+                  <a:extLst>
+                    <a:ext uri="{9D8B030D-6E8A-4147-A177-3AD203B41FA5}">
+                      <a16:colId xmlns:a16="http://schemas.microsoft.com/office/drawing/2014/main" val="3235857736"/>
+                    </a:ext>
+                  </a:extLst>
+                </a:gridCol>
+                <a:gridCol w="609600">
+                  <a:extLst>
+                    <a:ext uri="{9D8B030D-6E8A-4147-A177-3AD203B41FA5}">
+                      <a16:colId xmlns:a16="http://schemas.microsoft.com/office/drawing/2014/main" val="754305361"/>
+                    </a:ext>
+                  </a:extLst>
+                </a:gridCol>
+                <a:gridCol w="609600">
+                  <a:extLst>
+                    <a:ext uri="{9D8B030D-6E8A-4147-A177-3AD203B41FA5}">
+                      <a16:colId xmlns:a16="http://schemas.microsoft.com/office/drawing/2014/main" val="3837103717"/>
+                    </a:ext>
+                  </a:extLst>
+                </a:gridCol>
+                <a:gridCol w="609600">
+                  <a:extLst>
+                    <a:ext uri="{9D8B030D-6E8A-4147-A177-3AD203B41FA5}">
+                      <a16:colId xmlns:a16="http://schemas.microsoft.com/office/drawing/2014/main" val="2449964435"/>
+                    </a:ext>
+                  </a:extLst>
+                </a:gridCol>
+                <a:gridCol w="609600">
+                  <a:extLst>
+                    <a:ext uri="{9D8B030D-6E8A-4147-A177-3AD203B41FA5}">
+                      <a16:colId xmlns:a16="http://schemas.microsoft.com/office/drawing/2014/main" val="2577262122"/>
+                    </a:ext>
+                  </a:extLst>
+                </a:gridCol>
+                <a:gridCol w="609600">
+                  <a:extLst>
+                    <a:ext uri="{9D8B030D-6E8A-4147-A177-3AD203B41FA5}">
+                      <a16:colId xmlns:a16="http://schemas.microsoft.com/office/drawing/2014/main" val="3767781744"/>
+                    </a:ext>
+                  </a:extLst>
+                </a:gridCol>
+              </a:tblGrid>
+              <a:tr h="368880">
+                <a:tc>
+                  <a:txBody>
+                    <a:bodyPr/>
+                    <a:lstStyle/>
+                    <a:p>
+                      <a:pPr algn="ctr" fontAlgn="ctr"/>
+                      <a:r>
+                        <a:rPr lang="en-US" sz="1200" b="1" u="none" strike="noStrike" dirty="0">
+                          <a:effectLst/>
+                        </a:rPr>
+                        <a:t>57</a:t>
+                      </a:r>
+                      <a:endParaRPr lang="en-US" sz="1200" b="1" i="0" u="none" strike="noStrike" dirty="0">
+                        <a:solidFill>
+                          <a:srgbClr val="000000"/>
+                        </a:solidFill>
+                        <a:effectLst/>
+                        <a:latin typeface="Calibri Light" panose="020F0302020204030204" pitchFamily="34" charset="0"/>
+                      </a:endParaRPr>
+                    </a:p>
+                  </a:txBody>
+                  <a:tcPr marL="9525" marR="9525" marT="9525" marB="0" anchor="ctr"/>
+                </a:tc>
+                <a:tc>
+                  <a:txBody>
+                    <a:bodyPr/>
+                    <a:lstStyle/>
+                    <a:p>
+                      <a:pPr algn="ctr" fontAlgn="ctr"/>
+                      <a:r>
+                        <a:rPr lang="en-US" sz="1000" u="none" strike="noStrike" dirty="0">
+                          <a:effectLst/>
+                        </a:rPr>
+                        <a:t>60</a:t>
+                      </a:r>
+                      <a:endParaRPr lang="en-US" sz="1000" b="0" i="0" u="none" strike="noStrike" dirty="0">
+                        <a:solidFill>
+                          <a:srgbClr val="000000"/>
+                        </a:solidFill>
+                        <a:effectLst/>
+                        <a:latin typeface="Arial Narrow" panose="020B0606020202030204" pitchFamily="34" charset="0"/>
+                      </a:endParaRPr>
+                    </a:p>
+                  </a:txBody>
+                  <a:tcPr marL="9525" marR="9525" marT="9525" marB="0" anchor="ctr"/>
+                </a:tc>
+                <a:tc>
+                  <a:txBody>
+                    <a:bodyPr/>
+                    <a:lstStyle/>
+                    <a:p>
+                      <a:pPr algn="ctr" fontAlgn="ctr"/>
+                      <a:r>
+                        <a:rPr lang="en-US" sz="1000" u="none" strike="noStrike">
+                          <a:effectLst/>
+                        </a:rPr>
+                        <a:t>62</a:t>
+                      </a:r>
+                      <a:endParaRPr lang="en-US" sz="1000" b="0" i="0" u="none" strike="noStrike">
+                        <a:solidFill>
+                          <a:srgbClr val="000000"/>
+                        </a:solidFill>
+                        <a:effectLst/>
+                        <a:latin typeface="Arial Narrow" panose="020B0606020202030204" pitchFamily="34" charset="0"/>
+                      </a:endParaRPr>
+                    </a:p>
+                  </a:txBody>
+                  <a:tcPr marL="9525" marR="9525" marT="9525" marB="0" anchor="ctr"/>
+                </a:tc>
+                <a:tc>
+                  <a:txBody>
+                    <a:bodyPr/>
+                    <a:lstStyle/>
+                    <a:p>
+                      <a:pPr algn="ctr" fontAlgn="ctr"/>
+                      <a:r>
+                        <a:rPr lang="en-US" sz="1000" u="none" strike="noStrike">
+                          <a:effectLst/>
+                        </a:rPr>
+                        <a:t>63</a:t>
+                      </a:r>
+                      <a:endParaRPr lang="en-US" sz="1000" b="0" i="0" u="none" strike="noStrike">
+                        <a:solidFill>
+                          <a:srgbClr val="000000"/>
+                        </a:solidFill>
+                        <a:effectLst/>
+                        <a:latin typeface="Arial Narrow" panose="020B0606020202030204" pitchFamily="34" charset="0"/>
+                      </a:endParaRPr>
+                    </a:p>
+                  </a:txBody>
+                  <a:tcPr marL="9525" marR="9525" marT="9525" marB="0" anchor="ctr"/>
+                </a:tc>
+                <a:tc>
+                  <a:txBody>
+                    <a:bodyPr/>
+                    <a:lstStyle/>
+                    <a:p>
+                      <a:pPr algn="ctr" fontAlgn="ctr"/>
+                      <a:r>
+                        <a:rPr lang="en-US" sz="1000" u="none" strike="noStrike">
+                          <a:effectLst/>
+                        </a:rPr>
+                        <a:t>66</a:t>
+                      </a:r>
+                      <a:endParaRPr lang="en-US" sz="1000" b="0" i="0" u="none" strike="noStrike">
+                        <a:solidFill>
+                          <a:srgbClr val="000000"/>
+                        </a:solidFill>
+                        <a:effectLst/>
+                        <a:latin typeface="Calibri Light" panose="020F0302020204030204" pitchFamily="34" charset="0"/>
+                      </a:endParaRPr>
+                    </a:p>
+                  </a:txBody>
+                  <a:tcPr marL="9525" marR="9525" marT="9525" marB="0" anchor="ctr"/>
+                </a:tc>
+                <a:tc>
+                  <a:txBody>
+                    <a:bodyPr/>
+                    <a:lstStyle/>
+                    <a:p>
+                      <a:pPr algn="ctr" fontAlgn="ctr"/>
+                      <a:r>
+                        <a:rPr lang="en-US" sz="1000" u="none" strike="noStrike">
+                          <a:effectLst/>
+                        </a:rPr>
+                        <a:t>70</a:t>
+                      </a:r>
+                      <a:endParaRPr lang="en-US" sz="1000" b="0" i="0" u="none" strike="noStrike">
+                        <a:solidFill>
+                          <a:srgbClr val="000000"/>
+                        </a:solidFill>
+                        <a:effectLst/>
+                        <a:latin typeface="Calibri Light" panose="020F0302020204030204" pitchFamily="34" charset="0"/>
+                      </a:endParaRPr>
+                    </a:p>
+                  </a:txBody>
+                  <a:tcPr marL="9525" marR="9525" marT="9525" marB="0" anchor="ctr"/>
+                </a:tc>
+                <a:tc>
+                  <a:txBody>
+                    <a:bodyPr/>
+                    <a:lstStyle/>
+                    <a:p>
+                      <a:pPr algn="ctr" fontAlgn="ctr"/>
+                      <a:r>
+                        <a:rPr lang="en-US" sz="1000" u="none" strike="noStrike">
+                          <a:effectLst/>
+                        </a:rPr>
+                        <a:t>74</a:t>
+                      </a:r>
+                      <a:endParaRPr lang="en-US" sz="1000" b="0" i="0" u="none" strike="noStrike">
+                        <a:solidFill>
+                          <a:srgbClr val="000000"/>
+                        </a:solidFill>
+                        <a:effectLst/>
+                        <a:latin typeface="Calibri Light" panose="020F0302020204030204" pitchFamily="34" charset="0"/>
+                      </a:endParaRPr>
+                    </a:p>
+                  </a:txBody>
+                  <a:tcPr marL="9525" marR="9525" marT="9525" marB="0" anchor="ctr"/>
+                </a:tc>
+                <a:tc>
+                  <a:txBody>
+                    <a:bodyPr/>
+                    <a:lstStyle/>
+                    <a:p>
+                      <a:pPr algn="ctr" fontAlgn="ctr"/>
+                      <a:r>
+                        <a:rPr lang="en-US" sz="1000" u="none" strike="noStrike">
+                          <a:effectLst/>
+                        </a:rPr>
+                        <a:t>78</a:t>
+                      </a:r>
+                      <a:endParaRPr lang="en-US" sz="1000" b="0" i="0" u="none" strike="noStrike">
+                        <a:solidFill>
+                          <a:srgbClr val="000000"/>
+                        </a:solidFill>
+                        <a:effectLst/>
+                        <a:latin typeface="Calibri Light" panose="020F0302020204030204" pitchFamily="34" charset="0"/>
+                      </a:endParaRPr>
+                    </a:p>
+                  </a:txBody>
+                  <a:tcPr marL="9525" marR="9525" marT="9525" marB="0" anchor="ctr"/>
+                </a:tc>
+                <a:tc>
+                  <a:txBody>
+                    <a:bodyPr/>
+                    <a:lstStyle/>
+                    <a:p>
+                      <a:pPr algn="ctr" fontAlgn="ctr"/>
+                      <a:r>
+                        <a:rPr lang="en-US" sz="1000" u="none" strike="noStrike">
+                          <a:effectLst/>
+                        </a:rPr>
+                        <a:t>79</a:t>
+                      </a:r>
+                      <a:endParaRPr lang="en-US" sz="1000" b="0" i="0" u="none" strike="noStrike">
+                        <a:solidFill>
+                          <a:srgbClr val="000000"/>
+                        </a:solidFill>
+                        <a:effectLst/>
+                        <a:latin typeface="Arial Narrow" panose="020B0606020202030204" pitchFamily="34" charset="0"/>
+                      </a:endParaRPr>
+                    </a:p>
+                  </a:txBody>
+                  <a:tcPr marL="9525" marR="9525" marT="9525" marB="0" anchor="ctr"/>
+                </a:tc>
+                <a:tc>
+                  <a:txBody>
+                    <a:bodyPr/>
+                    <a:lstStyle/>
+                    <a:p>
+                      <a:pPr algn="ctr" fontAlgn="ctr"/>
+                      <a:r>
+                        <a:rPr lang="en-US" sz="1000" u="none" strike="noStrike">
+                          <a:effectLst/>
+                        </a:rPr>
+                        <a:t>80</a:t>
+                      </a:r>
+                      <a:endParaRPr lang="en-US" sz="1000" b="0" i="0" u="none" strike="noStrike">
+                        <a:solidFill>
+                          <a:srgbClr val="000000"/>
+                        </a:solidFill>
+                        <a:effectLst/>
+                        <a:latin typeface="Calibri Light" panose="020F0302020204030204" pitchFamily="34" charset="0"/>
+                      </a:endParaRPr>
+                    </a:p>
+                  </a:txBody>
+                  <a:tcPr marL="9525" marR="9525" marT="9525" marB="0" anchor="ctr"/>
+                </a:tc>
+                <a:extLst>
+                  <a:ext uri="{0D108BD9-81ED-4DB2-BD59-A6C34878D82A}">
+                    <a16:rowId xmlns:a16="http://schemas.microsoft.com/office/drawing/2014/main" val="1721628426"/>
+                  </a:ext>
+                </a:extLst>
+              </a:tr>
+              <a:tr h="368880">
+                <a:tc>
+                  <a:txBody>
+                    <a:bodyPr/>
+                    <a:lstStyle/>
+                    <a:p>
+                      <a:pPr algn="ctr" fontAlgn="ctr"/>
+                      <a:r>
+                        <a:rPr lang="en-US" sz="1000" u="none" strike="noStrike">
+                          <a:effectLst/>
+                        </a:rPr>
+                        <a:t>80</a:t>
+                      </a:r>
+                      <a:endParaRPr lang="en-US" sz="1000" b="0" i="0" u="none" strike="noStrike">
+                        <a:solidFill>
+                          <a:srgbClr val="000000"/>
+                        </a:solidFill>
+                        <a:effectLst/>
+                        <a:latin typeface="Calibri Light" panose="020F0302020204030204" pitchFamily="34" charset="0"/>
+                      </a:endParaRPr>
+                    </a:p>
+                  </a:txBody>
+                  <a:tcPr marL="9525" marR="9525" marT="9525" marB="0" anchor="ctr"/>
+                </a:tc>
+                <a:tc>
+                  <a:txBody>
+                    <a:bodyPr/>
+                    <a:lstStyle/>
+                    <a:p>
+                      <a:pPr algn="ctr" fontAlgn="ctr"/>
+                      <a:r>
+                        <a:rPr lang="en-US" sz="1000" u="none" strike="noStrike">
+                          <a:effectLst/>
+                        </a:rPr>
+                        <a:t>81</a:t>
+                      </a:r>
+                      <a:endParaRPr lang="en-US" sz="1000" b="0" i="0" u="none" strike="noStrike">
+                        <a:solidFill>
+                          <a:srgbClr val="000000"/>
+                        </a:solidFill>
+                        <a:effectLst/>
+                        <a:latin typeface="Calibri Light" panose="020F0302020204030204" pitchFamily="34" charset="0"/>
+                      </a:endParaRPr>
+                    </a:p>
+                  </a:txBody>
+                  <a:tcPr marL="9525" marR="9525" marT="9525" marB="0" anchor="ctr"/>
+                </a:tc>
+                <a:tc>
+                  <a:txBody>
+                    <a:bodyPr/>
+                    <a:lstStyle/>
+                    <a:p>
+                      <a:pPr algn="ctr" fontAlgn="ctr"/>
+                      <a:r>
+                        <a:rPr lang="en-US" sz="1000" u="none" strike="noStrike">
+                          <a:effectLst/>
+                        </a:rPr>
+                        <a:t>84</a:t>
+                      </a:r>
+                      <a:endParaRPr lang="en-US" sz="1000" b="0" i="0" u="none" strike="noStrike">
+                        <a:solidFill>
+                          <a:srgbClr val="000000"/>
+                        </a:solidFill>
+                        <a:effectLst/>
+                        <a:latin typeface="Arial Narrow" panose="020B0606020202030204" pitchFamily="34" charset="0"/>
+                      </a:endParaRPr>
+                    </a:p>
+                  </a:txBody>
+                  <a:tcPr marL="9525" marR="9525" marT="9525" marB="0" anchor="ctr"/>
+                </a:tc>
+                <a:tc>
+                  <a:txBody>
+                    <a:bodyPr/>
+                    <a:lstStyle/>
+                    <a:p>
+                      <a:pPr algn="ctr" fontAlgn="ctr"/>
+                      <a:r>
+                        <a:rPr lang="en-US" sz="1000" u="none" strike="noStrike" dirty="0">
+                          <a:effectLst/>
+                        </a:rPr>
+                        <a:t>84</a:t>
+                      </a:r>
+                      <a:endParaRPr lang="en-US" sz="1000" b="0" i="0" u="none" strike="noStrike" dirty="0">
+                        <a:solidFill>
+                          <a:srgbClr val="000000"/>
+                        </a:solidFill>
+                        <a:effectLst/>
+                        <a:latin typeface="Arial Narrow" panose="020B0606020202030204" pitchFamily="34" charset="0"/>
+                      </a:endParaRPr>
+                    </a:p>
+                  </a:txBody>
+                  <a:tcPr marL="9525" marR="9525" marT="9525" marB="0" anchor="ctr"/>
+                </a:tc>
+                <a:tc>
+                  <a:txBody>
+                    <a:bodyPr/>
+                    <a:lstStyle/>
+                    <a:p>
+                      <a:pPr algn="ctr" fontAlgn="ctr"/>
+                      <a:r>
+                        <a:rPr lang="en-US" sz="1000" u="none" strike="noStrike">
+                          <a:effectLst/>
+                        </a:rPr>
+                        <a:t>85</a:t>
+                      </a:r>
+                      <a:endParaRPr lang="en-US" sz="1000" b="0" i="0" u="none" strike="noStrike">
+                        <a:solidFill>
+                          <a:srgbClr val="000000"/>
+                        </a:solidFill>
+                        <a:effectLst/>
+                        <a:latin typeface="Arial Narrow" panose="020B0606020202030204" pitchFamily="34" charset="0"/>
+                      </a:endParaRPr>
+                    </a:p>
+                  </a:txBody>
+                  <a:tcPr marL="9525" marR="9525" marT="9525" marB="0" anchor="ctr"/>
+                </a:tc>
+                <a:tc>
+                  <a:txBody>
+                    <a:bodyPr/>
+                    <a:lstStyle/>
+                    <a:p>
+                      <a:pPr algn="ctr" fontAlgn="ctr"/>
+                      <a:r>
+                        <a:rPr lang="en-US" sz="1000" u="none" strike="noStrike">
+                          <a:effectLst/>
+                        </a:rPr>
+                        <a:t>85</a:t>
+                      </a:r>
+                      <a:endParaRPr lang="en-US" sz="1000" b="0" i="0" u="none" strike="noStrike">
+                        <a:solidFill>
+                          <a:srgbClr val="000000"/>
+                        </a:solidFill>
+                        <a:effectLst/>
+                        <a:latin typeface="Arial Narrow" panose="020B0606020202030204" pitchFamily="34" charset="0"/>
+                      </a:endParaRPr>
+                    </a:p>
+                  </a:txBody>
+                  <a:tcPr marL="9525" marR="9525" marT="9525" marB="0" anchor="ctr"/>
+                </a:tc>
+                <a:tc>
+                  <a:txBody>
+                    <a:bodyPr/>
+                    <a:lstStyle/>
+                    <a:p>
+                      <a:pPr algn="ctr" fontAlgn="ctr"/>
+                      <a:r>
+                        <a:rPr lang="en-US" sz="1000" u="none" strike="noStrike">
+                          <a:effectLst/>
+                        </a:rPr>
+                        <a:t>86</a:t>
+                      </a:r>
+                      <a:endParaRPr lang="en-US" sz="1000" b="0" i="0" u="none" strike="noStrike">
+                        <a:solidFill>
+                          <a:srgbClr val="000000"/>
+                        </a:solidFill>
+                        <a:effectLst/>
+                        <a:latin typeface="Calibri Light" panose="020F0302020204030204" pitchFamily="34" charset="0"/>
+                      </a:endParaRPr>
+                    </a:p>
+                  </a:txBody>
+                  <a:tcPr marL="9525" marR="9525" marT="9525" marB="0" anchor="ctr"/>
+                </a:tc>
+                <a:tc>
+                  <a:txBody>
+                    <a:bodyPr/>
+                    <a:lstStyle/>
+                    <a:p>
+                      <a:pPr algn="ctr" fontAlgn="ctr"/>
+                      <a:r>
+                        <a:rPr lang="en-US" sz="1000" u="none" strike="noStrike">
+                          <a:effectLst/>
+                        </a:rPr>
+                        <a:t>86</a:t>
+                      </a:r>
+                      <a:endParaRPr lang="en-US" sz="1000" b="0" i="0" u="none" strike="noStrike">
+                        <a:solidFill>
+                          <a:srgbClr val="000000"/>
+                        </a:solidFill>
+                        <a:effectLst/>
+                        <a:latin typeface="Arial Narrow" panose="020B0606020202030204" pitchFamily="34" charset="0"/>
+                      </a:endParaRPr>
+                    </a:p>
+                  </a:txBody>
+                  <a:tcPr marL="9525" marR="9525" marT="9525" marB="0" anchor="ctr"/>
+                </a:tc>
+                <a:tc>
+                  <a:txBody>
+                    <a:bodyPr/>
+                    <a:lstStyle/>
+                    <a:p>
+                      <a:pPr algn="ctr" fontAlgn="ctr"/>
+                      <a:r>
+                        <a:rPr lang="en-US" sz="1000" u="none" strike="noStrike">
+                          <a:effectLst/>
+                        </a:rPr>
+                        <a:t>86</a:t>
+                      </a:r>
+                      <a:endParaRPr lang="en-US" sz="1000" b="0" i="0" u="none" strike="noStrike">
+                        <a:solidFill>
+                          <a:srgbClr val="000000"/>
+                        </a:solidFill>
+                        <a:effectLst/>
+                        <a:latin typeface="Arial Narrow" panose="020B0606020202030204" pitchFamily="34" charset="0"/>
+                      </a:endParaRPr>
+                    </a:p>
+                  </a:txBody>
+                  <a:tcPr marL="9525" marR="9525" marT="9525" marB="0" anchor="ctr"/>
+                </a:tc>
+                <a:tc>
+                  <a:txBody>
+                    <a:bodyPr/>
+                    <a:lstStyle/>
+                    <a:p>
+                      <a:pPr algn="ctr" fontAlgn="ctr"/>
+                      <a:r>
+                        <a:rPr lang="en-US" sz="1000" u="none" strike="noStrike">
+                          <a:effectLst/>
+                        </a:rPr>
+                        <a:t>86</a:t>
+                      </a:r>
+                      <a:endParaRPr lang="en-US" sz="1000" b="0" i="0" u="none" strike="noStrike">
+                        <a:solidFill>
+                          <a:srgbClr val="000000"/>
+                        </a:solidFill>
+                        <a:effectLst/>
+                        <a:latin typeface="Arial Narrow" panose="020B0606020202030204" pitchFamily="34" charset="0"/>
+                      </a:endParaRPr>
+                    </a:p>
+                  </a:txBody>
+                  <a:tcPr marL="9525" marR="9525" marT="9525" marB="0" anchor="ctr"/>
+                </a:tc>
+                <a:extLst>
+                  <a:ext uri="{0D108BD9-81ED-4DB2-BD59-A6C34878D82A}">
+                    <a16:rowId xmlns:a16="http://schemas.microsoft.com/office/drawing/2014/main" val="339083855"/>
+                  </a:ext>
+                </a:extLst>
+              </a:tr>
+              <a:tr h="368880">
+                <a:tc>
+                  <a:txBody>
+                    <a:bodyPr/>
+                    <a:lstStyle/>
+                    <a:p>
+                      <a:pPr algn="ctr" fontAlgn="ctr"/>
+                      <a:r>
+                        <a:rPr lang="en-US" sz="1000" u="none" strike="noStrike">
+                          <a:effectLst/>
+                        </a:rPr>
+                        <a:t>86</a:t>
+                      </a:r>
+                      <a:endParaRPr lang="en-US" sz="1000" b="0" i="0" u="none" strike="noStrike">
+                        <a:solidFill>
+                          <a:srgbClr val="000000"/>
+                        </a:solidFill>
+                        <a:effectLst/>
+                        <a:latin typeface="Arial Narrow" panose="020B0606020202030204" pitchFamily="34" charset="0"/>
+                      </a:endParaRPr>
+                    </a:p>
+                  </a:txBody>
+                  <a:tcPr marL="9525" marR="9525" marT="9525" marB="0" anchor="ctr"/>
+                </a:tc>
+                <a:tc>
+                  <a:txBody>
+                    <a:bodyPr/>
+                    <a:lstStyle/>
+                    <a:p>
+                      <a:pPr algn="ctr" fontAlgn="ctr"/>
+                      <a:r>
+                        <a:rPr lang="en-US" sz="1000" u="none" strike="noStrike">
+                          <a:effectLst/>
+                        </a:rPr>
+                        <a:t>86</a:t>
+                      </a:r>
+                      <a:endParaRPr lang="en-US" sz="1000" b="0" i="0" u="none" strike="noStrike">
+                        <a:solidFill>
+                          <a:srgbClr val="000000"/>
+                        </a:solidFill>
+                        <a:effectLst/>
+                        <a:latin typeface="Calibri Light" panose="020F0302020204030204" pitchFamily="34" charset="0"/>
+                      </a:endParaRPr>
+                    </a:p>
+                  </a:txBody>
+                  <a:tcPr marL="9525" marR="9525" marT="9525" marB="0" anchor="ctr"/>
+                </a:tc>
+                <a:tc>
+                  <a:txBody>
+                    <a:bodyPr/>
+                    <a:lstStyle/>
+                    <a:p>
+                      <a:pPr algn="ctr" fontAlgn="ctr"/>
+                      <a:r>
+                        <a:rPr lang="en-US" sz="1000" u="none" strike="noStrike">
+                          <a:effectLst/>
+                        </a:rPr>
+                        <a:t>87</a:t>
+                      </a:r>
+                      <a:endParaRPr lang="en-US" sz="1000" b="0" i="0" u="none" strike="noStrike">
+                        <a:solidFill>
+                          <a:srgbClr val="000000"/>
+                        </a:solidFill>
+                        <a:effectLst/>
+                        <a:latin typeface="Arial Narrow" panose="020B0606020202030204" pitchFamily="34" charset="0"/>
+                      </a:endParaRPr>
+                    </a:p>
+                  </a:txBody>
+                  <a:tcPr marL="9525" marR="9525" marT="9525" marB="0" anchor="ctr"/>
+                </a:tc>
+                <a:tc>
+                  <a:txBody>
+                    <a:bodyPr/>
+                    <a:lstStyle/>
+                    <a:p>
+                      <a:pPr algn="ctr" fontAlgn="ctr"/>
+                      <a:r>
+                        <a:rPr lang="en-US" sz="1000" u="none" strike="noStrike">
+                          <a:effectLst/>
+                        </a:rPr>
+                        <a:t>87</a:t>
+                      </a:r>
+                      <a:endParaRPr lang="en-US" sz="1000" b="0" i="0" u="none" strike="noStrike">
+                        <a:solidFill>
+                          <a:srgbClr val="000000"/>
+                        </a:solidFill>
+                        <a:effectLst/>
+                        <a:latin typeface="Calibri Light" panose="020F0302020204030204" pitchFamily="34" charset="0"/>
+                      </a:endParaRPr>
+                    </a:p>
+                  </a:txBody>
+                  <a:tcPr marL="9525" marR="9525" marT="9525" marB="0" anchor="ctr"/>
+                </a:tc>
+                <a:tc>
+                  <a:txBody>
+                    <a:bodyPr/>
+                    <a:lstStyle/>
+                    <a:p>
+                      <a:pPr algn="ctr" fontAlgn="ctr"/>
+                      <a:r>
+                        <a:rPr lang="en-US" sz="1000" u="none" strike="noStrike">
+                          <a:effectLst/>
+                        </a:rPr>
+                        <a:t>89</a:t>
+                      </a:r>
+                      <a:endParaRPr lang="en-US" sz="1000" b="0" i="0" u="none" strike="noStrike">
+                        <a:solidFill>
+                          <a:srgbClr val="000000"/>
+                        </a:solidFill>
+                        <a:effectLst/>
+                        <a:latin typeface="Calibri Light" panose="020F0302020204030204" pitchFamily="34" charset="0"/>
+                      </a:endParaRPr>
+                    </a:p>
+                  </a:txBody>
+                  <a:tcPr marL="9525" marR="9525" marT="9525" marB="0" anchor="ctr"/>
+                </a:tc>
+                <a:tc>
+                  <a:txBody>
+                    <a:bodyPr/>
+                    <a:lstStyle/>
+                    <a:p>
+                      <a:pPr algn="ctr" fontAlgn="ctr"/>
+                      <a:r>
+                        <a:rPr lang="en-US" sz="1000" u="none" strike="noStrike">
+                          <a:effectLst/>
+                        </a:rPr>
+                        <a:t>89</a:t>
+                      </a:r>
+                      <a:endParaRPr lang="en-US" sz="1000" b="0" i="0" u="none" strike="noStrike">
+                        <a:solidFill>
+                          <a:srgbClr val="000000"/>
+                        </a:solidFill>
+                        <a:effectLst/>
+                        <a:latin typeface="Arial Narrow" panose="020B0606020202030204" pitchFamily="34" charset="0"/>
+                      </a:endParaRPr>
+                    </a:p>
+                  </a:txBody>
+                  <a:tcPr marL="9525" marR="9525" marT="9525" marB="0" anchor="ctr"/>
+                </a:tc>
+                <a:tc>
+                  <a:txBody>
+                    <a:bodyPr/>
+                    <a:lstStyle/>
+                    <a:p>
+                      <a:pPr algn="ctr" fontAlgn="ctr"/>
+                      <a:r>
+                        <a:rPr lang="en-US" sz="1000" u="none" strike="noStrike">
+                          <a:effectLst/>
+                        </a:rPr>
+                        <a:t>89</a:t>
+                      </a:r>
+                      <a:endParaRPr lang="en-US" sz="1000" b="0" i="0" u="none" strike="noStrike">
+                        <a:solidFill>
+                          <a:srgbClr val="000000"/>
+                        </a:solidFill>
+                        <a:effectLst/>
+                        <a:latin typeface="Arial Narrow" panose="020B0606020202030204" pitchFamily="34" charset="0"/>
+                      </a:endParaRPr>
+                    </a:p>
+                  </a:txBody>
+                  <a:tcPr marL="9525" marR="9525" marT="9525" marB="0" anchor="ctr"/>
+                </a:tc>
+                <a:tc>
+                  <a:txBody>
+                    <a:bodyPr/>
+                    <a:lstStyle/>
+                    <a:p>
+                      <a:pPr algn="ctr" fontAlgn="ctr"/>
+                      <a:r>
+                        <a:rPr lang="en-US" sz="1000" u="none" strike="noStrike" dirty="0">
+                          <a:effectLst/>
+                        </a:rPr>
+                        <a:t>90</a:t>
+                      </a:r>
+                      <a:endParaRPr lang="en-US" sz="1000" b="0" i="0" u="none" strike="noStrike" dirty="0">
+                        <a:solidFill>
+                          <a:srgbClr val="000000"/>
+                        </a:solidFill>
+                        <a:effectLst/>
+                        <a:latin typeface="Arial Narrow" panose="020B0606020202030204" pitchFamily="34" charset="0"/>
+                      </a:endParaRPr>
+                    </a:p>
+                  </a:txBody>
+                  <a:tcPr marL="9525" marR="9525" marT="9525" marB="0" anchor="ctr"/>
+                </a:tc>
+                <a:tc>
+                  <a:txBody>
+                    <a:bodyPr/>
+                    <a:lstStyle/>
+                    <a:p>
+                      <a:pPr algn="ctr" fontAlgn="ctr"/>
+                      <a:r>
+                        <a:rPr lang="en-US" sz="1000" u="none" strike="noStrike">
+                          <a:effectLst/>
+                        </a:rPr>
+                        <a:t>90</a:t>
+                      </a:r>
+                      <a:endParaRPr lang="en-US" sz="1000" b="0" i="0" u="none" strike="noStrike">
+                        <a:solidFill>
+                          <a:srgbClr val="000000"/>
+                        </a:solidFill>
+                        <a:effectLst/>
+                        <a:latin typeface="Arial Narrow" panose="020B0606020202030204" pitchFamily="34" charset="0"/>
+                      </a:endParaRPr>
+                    </a:p>
+                  </a:txBody>
+                  <a:tcPr marL="9525" marR="9525" marT="9525" marB="0" anchor="ctr"/>
+                </a:tc>
+                <a:tc>
+                  <a:txBody>
+                    <a:bodyPr/>
+                    <a:lstStyle/>
+                    <a:p>
+                      <a:pPr algn="ctr" fontAlgn="ctr"/>
+                      <a:r>
+                        <a:rPr lang="en-US" sz="1000" u="none" strike="noStrike">
+                          <a:effectLst/>
+                        </a:rPr>
+                        <a:t>91</a:t>
+                      </a:r>
+                      <a:endParaRPr lang="en-US" sz="1000" b="0" i="0" u="none" strike="noStrike">
+                        <a:solidFill>
+                          <a:srgbClr val="000000"/>
+                        </a:solidFill>
+                        <a:effectLst/>
+                        <a:latin typeface="Arial Narrow" panose="020B0606020202030204" pitchFamily="34" charset="0"/>
+                      </a:endParaRPr>
+                    </a:p>
+                  </a:txBody>
+                  <a:tcPr marL="9525" marR="9525" marT="9525" marB="0" anchor="ctr"/>
+                </a:tc>
+                <a:extLst>
+                  <a:ext uri="{0D108BD9-81ED-4DB2-BD59-A6C34878D82A}">
+                    <a16:rowId xmlns:a16="http://schemas.microsoft.com/office/drawing/2014/main" val="2142153174"/>
+                  </a:ext>
+                </a:extLst>
+              </a:tr>
+              <a:tr h="368880">
+                <a:tc>
+                  <a:txBody>
+                    <a:bodyPr/>
+                    <a:lstStyle/>
+                    <a:p>
+                      <a:pPr algn="ctr" fontAlgn="ctr"/>
+                      <a:r>
+                        <a:rPr lang="en-US" sz="1000" u="none" strike="noStrike">
+                          <a:effectLst/>
+                        </a:rPr>
+                        <a:t>91</a:t>
+                      </a:r>
+                      <a:endParaRPr lang="en-US" sz="1000" b="0" i="0" u="none" strike="noStrike">
+                        <a:solidFill>
+                          <a:srgbClr val="000000"/>
+                        </a:solidFill>
+                        <a:effectLst/>
+                        <a:latin typeface="Arial Narrow" panose="020B0606020202030204" pitchFamily="34" charset="0"/>
+                      </a:endParaRPr>
+                    </a:p>
+                  </a:txBody>
+                  <a:tcPr marL="9525" marR="9525" marT="9525" marB="0" anchor="ctr"/>
+                </a:tc>
+                <a:tc>
+                  <a:txBody>
+                    <a:bodyPr/>
+                    <a:lstStyle/>
+                    <a:p>
+                      <a:pPr algn="ctr" fontAlgn="ctr"/>
+                      <a:r>
+                        <a:rPr lang="en-US" sz="1000" u="none" strike="noStrike">
+                          <a:effectLst/>
+                        </a:rPr>
+                        <a:t>91</a:t>
+                      </a:r>
+                      <a:endParaRPr lang="en-US" sz="1000" b="0" i="0" u="none" strike="noStrike">
+                        <a:solidFill>
+                          <a:srgbClr val="000000"/>
+                        </a:solidFill>
+                        <a:effectLst/>
+                        <a:latin typeface="Arial Narrow" panose="020B0606020202030204" pitchFamily="34" charset="0"/>
+                      </a:endParaRPr>
+                    </a:p>
+                  </a:txBody>
+                  <a:tcPr marL="9525" marR="9525" marT="9525" marB="0" anchor="ctr"/>
+                </a:tc>
+                <a:tc>
+                  <a:txBody>
+                    <a:bodyPr/>
+                    <a:lstStyle/>
+                    <a:p>
+                      <a:pPr algn="ctr" fontAlgn="ctr"/>
+                      <a:r>
+                        <a:rPr lang="en-US" sz="1000" u="none" strike="noStrike">
+                          <a:effectLst/>
+                        </a:rPr>
+                        <a:t>91</a:t>
+                      </a:r>
+                      <a:endParaRPr lang="en-US" sz="1000" b="0" i="0" u="none" strike="noStrike">
+                        <a:solidFill>
+                          <a:srgbClr val="000000"/>
+                        </a:solidFill>
+                        <a:effectLst/>
+                        <a:latin typeface="Arial Narrow" panose="020B0606020202030204" pitchFamily="34" charset="0"/>
+                      </a:endParaRPr>
+                    </a:p>
+                  </a:txBody>
+                  <a:tcPr marL="9525" marR="9525" marT="9525" marB="0" anchor="ctr"/>
+                </a:tc>
+                <a:tc>
+                  <a:txBody>
+                    <a:bodyPr/>
+                    <a:lstStyle/>
+                    <a:p>
+                      <a:pPr algn="ctr" fontAlgn="ctr"/>
+                      <a:r>
+                        <a:rPr lang="en-US" sz="1000" u="none" strike="noStrike">
+                          <a:effectLst/>
+                        </a:rPr>
+                        <a:t>92</a:t>
+                      </a:r>
+                      <a:endParaRPr lang="en-US" sz="1000" b="0" i="0" u="none" strike="noStrike">
+                        <a:solidFill>
+                          <a:srgbClr val="000000"/>
+                        </a:solidFill>
+                        <a:effectLst/>
+                        <a:latin typeface="Arial Narrow" panose="020B0606020202030204" pitchFamily="34" charset="0"/>
+                      </a:endParaRPr>
+                    </a:p>
+                  </a:txBody>
+                  <a:tcPr marL="9525" marR="9525" marT="9525" marB="0" anchor="ctr"/>
+                </a:tc>
+                <a:tc>
+                  <a:txBody>
+                    <a:bodyPr/>
+                    <a:lstStyle/>
+                    <a:p>
+                      <a:pPr algn="ctr" fontAlgn="ctr"/>
+                      <a:r>
+                        <a:rPr lang="en-US" sz="1000" u="none" strike="noStrike">
+                          <a:effectLst/>
+                        </a:rPr>
+                        <a:t>92</a:t>
+                      </a:r>
+                      <a:endParaRPr lang="en-US" sz="1000" b="0" i="0" u="none" strike="noStrike">
+                        <a:solidFill>
+                          <a:srgbClr val="000000"/>
+                        </a:solidFill>
+                        <a:effectLst/>
+                        <a:latin typeface="Arial Narrow" panose="020B0606020202030204" pitchFamily="34" charset="0"/>
+                      </a:endParaRPr>
+                    </a:p>
+                  </a:txBody>
+                  <a:tcPr marL="9525" marR="9525" marT="9525" marB="0" anchor="ctr"/>
+                </a:tc>
+                <a:tc>
+                  <a:txBody>
+                    <a:bodyPr/>
+                    <a:lstStyle/>
+                    <a:p>
+                      <a:pPr algn="ctr" fontAlgn="ctr"/>
+                      <a:r>
+                        <a:rPr lang="en-US" sz="1000" u="none" strike="noStrike" dirty="0">
+                          <a:effectLst/>
+                        </a:rPr>
+                        <a:t>92</a:t>
+                      </a:r>
+                      <a:endParaRPr lang="en-US" sz="1000" b="0" i="0" u="none" strike="noStrike" dirty="0">
+                        <a:solidFill>
+                          <a:srgbClr val="000000"/>
+                        </a:solidFill>
+                        <a:effectLst/>
+                        <a:latin typeface="Arial Narrow" panose="020B0606020202030204" pitchFamily="34" charset="0"/>
+                      </a:endParaRPr>
+                    </a:p>
+                  </a:txBody>
+                  <a:tcPr marL="9525" marR="9525" marT="9525" marB="0" anchor="ctr"/>
+                </a:tc>
+                <a:tc>
+                  <a:txBody>
+                    <a:bodyPr/>
+                    <a:lstStyle/>
+                    <a:p>
+                      <a:pPr algn="ctr" fontAlgn="ctr"/>
+                      <a:r>
+                        <a:rPr lang="en-US" sz="1000" u="none" strike="noStrike">
+                          <a:effectLst/>
+                        </a:rPr>
+                        <a:t>92</a:t>
+                      </a:r>
+                      <a:endParaRPr lang="en-US" sz="1000" b="0" i="0" u="none" strike="noStrike">
+                        <a:solidFill>
+                          <a:srgbClr val="000000"/>
+                        </a:solidFill>
+                        <a:effectLst/>
+                        <a:latin typeface="Arial Narrow" panose="020B0606020202030204" pitchFamily="34" charset="0"/>
+                      </a:endParaRPr>
+                    </a:p>
+                  </a:txBody>
+                  <a:tcPr marL="9525" marR="9525" marT="9525" marB="0" anchor="ctr"/>
+                </a:tc>
+                <a:tc>
+                  <a:txBody>
+                    <a:bodyPr/>
+                    <a:lstStyle/>
+                    <a:p>
+                      <a:pPr algn="ctr" fontAlgn="ctr"/>
+                      <a:r>
+                        <a:rPr lang="en-US" sz="1000" u="none" strike="noStrike">
+                          <a:effectLst/>
+                        </a:rPr>
+                        <a:t>93</a:t>
+                      </a:r>
+                      <a:endParaRPr lang="en-US" sz="1000" b="0" i="0" u="none" strike="noStrike">
+                        <a:solidFill>
+                          <a:srgbClr val="000000"/>
+                        </a:solidFill>
+                        <a:effectLst/>
+                        <a:latin typeface="Arial Narrow" panose="020B0606020202030204" pitchFamily="34" charset="0"/>
+                      </a:endParaRPr>
+                    </a:p>
+                  </a:txBody>
+                  <a:tcPr marL="9525" marR="9525" marT="9525" marB="0" anchor="ctr"/>
+                </a:tc>
+                <a:tc>
+                  <a:txBody>
+                    <a:bodyPr/>
+                    <a:lstStyle/>
+                    <a:p>
+                      <a:pPr algn="ctr" fontAlgn="ctr"/>
+                      <a:r>
+                        <a:rPr lang="en-US" sz="1000" u="none" strike="noStrike">
+                          <a:effectLst/>
+                        </a:rPr>
+                        <a:t>93</a:t>
+                      </a:r>
+                      <a:endParaRPr lang="en-US" sz="1000" b="0" i="0" u="none" strike="noStrike">
+                        <a:solidFill>
+                          <a:srgbClr val="000000"/>
+                        </a:solidFill>
+                        <a:effectLst/>
+                        <a:latin typeface="Arial Narrow" panose="020B0606020202030204" pitchFamily="34" charset="0"/>
+                      </a:endParaRPr>
+                    </a:p>
+                  </a:txBody>
+                  <a:tcPr marL="9525" marR="9525" marT="9525" marB="0" anchor="ctr"/>
+                </a:tc>
+                <a:tc>
+                  <a:txBody>
+                    <a:bodyPr/>
+                    <a:lstStyle/>
+                    <a:p>
+                      <a:pPr algn="ctr" fontAlgn="ctr"/>
+                      <a:r>
+                        <a:rPr lang="en-US" sz="1000" u="none" strike="noStrike">
+                          <a:effectLst/>
+                        </a:rPr>
+                        <a:t>93</a:t>
+                      </a:r>
+                      <a:endParaRPr lang="en-US" sz="1000" b="0" i="0" u="none" strike="noStrike">
+                        <a:solidFill>
+                          <a:srgbClr val="000000"/>
+                        </a:solidFill>
+                        <a:effectLst/>
+                        <a:latin typeface="Arial Narrow" panose="020B0606020202030204" pitchFamily="34" charset="0"/>
+                      </a:endParaRPr>
+                    </a:p>
+                  </a:txBody>
+                  <a:tcPr marL="9525" marR="9525" marT="9525" marB="0" anchor="ctr"/>
+                </a:tc>
+                <a:extLst>
+                  <a:ext uri="{0D108BD9-81ED-4DB2-BD59-A6C34878D82A}">
+                    <a16:rowId xmlns:a16="http://schemas.microsoft.com/office/drawing/2014/main" val="3291880929"/>
+                  </a:ext>
+                </a:extLst>
+              </a:tr>
+              <a:tr h="368880">
+                <a:tc>
+                  <a:txBody>
+                    <a:bodyPr/>
+                    <a:lstStyle/>
+                    <a:p>
+                      <a:pPr algn="ctr" fontAlgn="ctr"/>
+                      <a:r>
+                        <a:rPr lang="en-US" sz="1000" u="none" strike="noStrike">
+                          <a:effectLst/>
+                        </a:rPr>
+                        <a:t>94</a:t>
+                      </a:r>
+                      <a:endParaRPr lang="en-US" sz="1000" b="0" i="0" u="none" strike="noStrike">
+                        <a:solidFill>
+                          <a:srgbClr val="000000"/>
+                        </a:solidFill>
+                        <a:effectLst/>
+                        <a:latin typeface="Arial Narrow" panose="020B0606020202030204" pitchFamily="34" charset="0"/>
+                      </a:endParaRPr>
+                    </a:p>
+                  </a:txBody>
+                  <a:tcPr marL="9525" marR="9525" marT="9525" marB="0" anchor="ctr"/>
+                </a:tc>
+                <a:tc>
+                  <a:txBody>
+                    <a:bodyPr/>
+                    <a:lstStyle/>
+                    <a:p>
+                      <a:pPr algn="ctr" fontAlgn="ctr"/>
+                      <a:r>
+                        <a:rPr lang="en-US" sz="1000" u="none" strike="noStrike">
+                          <a:effectLst/>
+                        </a:rPr>
+                        <a:t>94</a:t>
+                      </a:r>
+                      <a:endParaRPr lang="en-US" sz="1000" b="0" i="0" u="none" strike="noStrike">
+                        <a:solidFill>
+                          <a:srgbClr val="000000"/>
+                        </a:solidFill>
+                        <a:effectLst/>
+                        <a:latin typeface="Arial Narrow" panose="020B0606020202030204" pitchFamily="34" charset="0"/>
+                      </a:endParaRPr>
+                    </a:p>
+                  </a:txBody>
+                  <a:tcPr marL="9525" marR="9525" marT="9525" marB="0" anchor="ctr"/>
+                </a:tc>
+                <a:tc>
+                  <a:txBody>
+                    <a:bodyPr/>
+                    <a:lstStyle/>
+                    <a:p>
+                      <a:pPr algn="ctr" fontAlgn="ctr"/>
+                      <a:r>
+                        <a:rPr lang="en-US" sz="1000" u="none" strike="noStrike">
+                          <a:effectLst/>
+                        </a:rPr>
+                        <a:t>94</a:t>
+                      </a:r>
+                      <a:endParaRPr lang="en-US" sz="1000" b="0" i="0" u="none" strike="noStrike">
+                        <a:solidFill>
+                          <a:srgbClr val="000000"/>
+                        </a:solidFill>
+                        <a:effectLst/>
+                        <a:latin typeface="Arial Narrow" panose="020B0606020202030204" pitchFamily="34" charset="0"/>
+                      </a:endParaRPr>
+                    </a:p>
+                  </a:txBody>
+                  <a:tcPr marL="9525" marR="9525" marT="9525" marB="0" anchor="ctr"/>
+                </a:tc>
+                <a:tc>
+                  <a:txBody>
+                    <a:bodyPr/>
+                    <a:lstStyle/>
+                    <a:p>
+                      <a:pPr algn="ctr" fontAlgn="ctr"/>
+                      <a:r>
+                        <a:rPr lang="en-US" sz="1000" u="none" strike="noStrike">
+                          <a:effectLst/>
+                        </a:rPr>
+                        <a:t>95</a:t>
+                      </a:r>
+                      <a:endParaRPr lang="en-US" sz="1000" b="0" i="0" u="none" strike="noStrike">
+                        <a:solidFill>
+                          <a:srgbClr val="000000"/>
+                        </a:solidFill>
+                        <a:effectLst/>
+                        <a:latin typeface="Arial Narrow" panose="020B0606020202030204" pitchFamily="34" charset="0"/>
+                      </a:endParaRPr>
+                    </a:p>
+                  </a:txBody>
+                  <a:tcPr marL="9525" marR="9525" marT="9525" marB="0" anchor="ctr"/>
+                </a:tc>
+                <a:tc>
+                  <a:txBody>
+                    <a:bodyPr/>
+                    <a:lstStyle/>
+                    <a:p>
+                      <a:pPr algn="ctr" fontAlgn="ctr"/>
+                      <a:r>
+                        <a:rPr lang="en-US" sz="1000" u="none" strike="noStrike">
+                          <a:effectLst/>
+                        </a:rPr>
+                        <a:t>95</a:t>
+                      </a:r>
+                      <a:endParaRPr lang="en-US" sz="1000" b="0" i="0" u="none" strike="noStrike">
+                        <a:solidFill>
+                          <a:srgbClr val="000000"/>
+                        </a:solidFill>
+                        <a:effectLst/>
+                        <a:latin typeface="Arial Narrow" panose="020B0606020202030204" pitchFamily="34" charset="0"/>
+                      </a:endParaRPr>
+                    </a:p>
+                  </a:txBody>
+                  <a:tcPr marL="9525" marR="9525" marT="9525" marB="0" anchor="ctr"/>
+                </a:tc>
+                <a:tc>
+                  <a:txBody>
+                    <a:bodyPr/>
+                    <a:lstStyle/>
+                    <a:p>
+                      <a:pPr algn="ctr" fontAlgn="ctr"/>
+                      <a:r>
+                        <a:rPr lang="en-US" sz="1000" u="none" strike="noStrike">
+                          <a:effectLst/>
+                        </a:rPr>
+                        <a:t>95</a:t>
+                      </a:r>
+                      <a:endParaRPr lang="en-US" sz="1000" b="0" i="0" u="none" strike="noStrike">
+                        <a:solidFill>
+                          <a:srgbClr val="000000"/>
+                        </a:solidFill>
+                        <a:effectLst/>
+                        <a:latin typeface="Arial Narrow" panose="020B0606020202030204" pitchFamily="34" charset="0"/>
+                      </a:endParaRPr>
+                    </a:p>
+                  </a:txBody>
+                  <a:tcPr marL="9525" marR="9525" marT="9525" marB="0" anchor="ctr"/>
+                </a:tc>
+                <a:tc>
+                  <a:txBody>
+                    <a:bodyPr/>
+                    <a:lstStyle/>
+                    <a:p>
+                      <a:pPr algn="ctr" fontAlgn="ctr"/>
+                      <a:r>
+                        <a:rPr lang="en-US" sz="1000" u="none" strike="noStrike">
+                          <a:effectLst/>
+                        </a:rPr>
+                        <a:t>96</a:t>
+                      </a:r>
+                      <a:endParaRPr lang="en-US" sz="1000" b="0" i="0" u="none" strike="noStrike">
+                        <a:solidFill>
+                          <a:srgbClr val="000000"/>
+                        </a:solidFill>
+                        <a:effectLst/>
+                        <a:latin typeface="Calibri Light" panose="020F0302020204030204" pitchFamily="34" charset="0"/>
+                      </a:endParaRPr>
+                    </a:p>
+                  </a:txBody>
+                  <a:tcPr marL="9525" marR="9525" marT="9525" marB="0" anchor="ctr"/>
+                </a:tc>
+                <a:tc>
+                  <a:txBody>
+                    <a:bodyPr/>
+                    <a:lstStyle/>
+                    <a:p>
+                      <a:pPr algn="ctr" fontAlgn="ctr"/>
+                      <a:r>
+                        <a:rPr lang="en-US" sz="1000" u="none" strike="noStrike">
+                          <a:effectLst/>
+                        </a:rPr>
+                        <a:t>96</a:t>
+                      </a:r>
+                      <a:endParaRPr lang="en-US" sz="1000" b="0" i="0" u="none" strike="noStrike">
+                        <a:solidFill>
+                          <a:srgbClr val="000000"/>
+                        </a:solidFill>
+                        <a:effectLst/>
+                        <a:latin typeface="Calibri Light" panose="020F0302020204030204" pitchFamily="34" charset="0"/>
+                      </a:endParaRPr>
+                    </a:p>
+                  </a:txBody>
+                  <a:tcPr marL="9525" marR="9525" marT="9525" marB="0" anchor="ctr"/>
+                </a:tc>
+                <a:tc>
+                  <a:txBody>
+                    <a:bodyPr/>
+                    <a:lstStyle/>
+                    <a:p>
+                      <a:pPr algn="ctr" fontAlgn="ctr"/>
+                      <a:r>
+                        <a:rPr lang="en-US" sz="1000" u="none" strike="noStrike">
+                          <a:effectLst/>
+                        </a:rPr>
+                        <a:t>96</a:t>
+                      </a:r>
+                      <a:endParaRPr lang="en-US" sz="1000" b="0" i="0" u="none" strike="noStrike">
+                        <a:solidFill>
+                          <a:srgbClr val="000000"/>
+                        </a:solidFill>
+                        <a:effectLst/>
+                        <a:latin typeface="Arial Narrow" panose="020B0606020202030204" pitchFamily="34" charset="0"/>
+                      </a:endParaRPr>
+                    </a:p>
+                  </a:txBody>
+                  <a:tcPr marL="9525" marR="9525" marT="9525" marB="0" anchor="ctr"/>
+                </a:tc>
+                <a:tc>
+                  <a:txBody>
+                    <a:bodyPr/>
+                    <a:lstStyle/>
+                    <a:p>
+                      <a:pPr algn="ctr" fontAlgn="ctr"/>
+                      <a:r>
+                        <a:rPr lang="en-US" sz="1200" b="1" u="none" strike="noStrike" dirty="0">
+                          <a:effectLst/>
+                        </a:rPr>
+                        <a:t>97</a:t>
+                      </a:r>
+                      <a:endParaRPr lang="en-US" sz="1200" b="1" i="0" u="none" strike="noStrike" dirty="0">
+                        <a:solidFill>
+                          <a:srgbClr val="000000"/>
+                        </a:solidFill>
+                        <a:effectLst/>
+                        <a:latin typeface="Arial Narrow" panose="020B0606020202030204" pitchFamily="34" charset="0"/>
+                      </a:endParaRPr>
+                    </a:p>
+                  </a:txBody>
+                  <a:tcPr marL="9525" marR="9525" marT="9525" marB="0" anchor="ctr"/>
+                </a:tc>
+                <a:extLst>
+                  <a:ext uri="{0D108BD9-81ED-4DB2-BD59-A6C34878D82A}">
+                    <a16:rowId xmlns:a16="http://schemas.microsoft.com/office/drawing/2014/main" val="1452751189"/>
+                  </a:ext>
+                </a:extLst>
+              </a:tr>
+            </a:tbl>
+          </a:graphicData>
+        </a:graphic>
+      </p:graphicFrame>
+    </p:spTree>
+    <p:extLst>
+      <p:ext uri="{BB962C8B-B14F-4D97-AF65-F5344CB8AC3E}">
+        <p14:creationId xmlns:p14="http://schemas.microsoft.com/office/powerpoint/2010/main" val="1874620965"/>
+      </p:ext>
+    </p:extLst>
+  </p:cSld>
+  <p:clrMapOvr>
+    <a:masterClrMapping/>
+  </p:clrMapOvr>
+</p:sld>
+</file>
+
+<file path=ppt/slides/slide15.xml><?xml version="1.0" encoding="utf-8"?>
+<p:sld xmlns:a="http://schemas.openxmlformats.org/drawingml/2006/main" xmlns:r="http://schemas.openxmlformats.org/officeDocument/2006/relationships" xmlns:p="http://schemas.openxmlformats.org/presentationml/2006/main">
+  <p:cSld>
+    <p:spTree>
+      <p:nvGrpSpPr>
+        <p:cNvPr id="1" name=""/>
+        <p:cNvGrpSpPr/>
+        <p:nvPr/>
+      </p:nvGrpSpPr>
+      <p:grpSpPr>
+        <a:xfrm>
+          <a:off x="0" y="0"/>
+          <a:ext cx="0" cy="0"/>
+          <a:chOff x="0" y="0"/>
+          <a:chExt cx="0" cy="0"/>
+        </a:xfrm>
+      </p:grpSpPr>
+      <p:sp>
+        <p:nvSpPr>
+          <p:cNvPr id="2" name="Text Placeholder 1"/>
+          <p:cNvSpPr>
+            <a:spLocks noGrp="1"/>
+          </p:cNvSpPr>
+          <p:nvPr>
+            <p:ph type="body" sz="quarter" idx="10"/>
+          </p:nvPr>
+        </p:nvSpPr>
+        <p:spPr/>
+        <p:txBody>
+          <a:bodyPr/>
+          <a:lstStyle/>
+          <a:p>
+            <a:r>
+              <a:rPr lang="en-US" altLang="ko-KR" dirty="0" err="1"/>
+              <a:t>Studi</a:t>
+            </a:r>
+            <a:r>
+              <a:rPr lang="en-US" altLang="ko-KR" dirty="0"/>
+              <a:t> </a:t>
+            </a:r>
+            <a:r>
+              <a:rPr lang="en-US" altLang="ko-KR" dirty="0" err="1"/>
+              <a:t>Kasus</a:t>
+            </a:r>
+            <a:endParaRPr lang="ko-KR" altLang="en-US" dirty="0"/>
+          </a:p>
+        </p:txBody>
+      </p:sp>
+      <p:sp>
+        <p:nvSpPr>
+          <p:cNvPr id="3" name="Text Placeholder 2"/>
+          <p:cNvSpPr>
+            <a:spLocks noGrp="1"/>
+          </p:cNvSpPr>
+          <p:nvPr>
+            <p:ph type="body" sz="quarter" idx="11"/>
+          </p:nvPr>
+        </p:nvSpPr>
+        <p:spPr/>
+        <p:txBody>
+          <a:bodyPr/>
+          <a:lstStyle/>
+          <a:p>
+            <a:pPr lvl="0"/>
+            <a:r>
+              <a:rPr lang="en-US" b="1" dirty="0" err="1"/>
+              <a:t>Tabel</a:t>
+            </a:r>
+            <a:r>
+              <a:rPr lang="en-US" b="1" dirty="0"/>
+              <a:t> data </a:t>
+            </a:r>
+            <a:r>
+              <a:rPr lang="en-US" b="1" dirty="0" err="1"/>
+              <a:t>nilai</a:t>
+            </a:r>
+            <a:r>
+              <a:rPr lang="en-US" b="1" dirty="0"/>
+              <a:t> </a:t>
+            </a:r>
+            <a:r>
+              <a:rPr lang="en-US" b="1" dirty="0" err="1"/>
+              <a:t>ujian</a:t>
+            </a:r>
+            <a:r>
+              <a:rPr lang="en-US" b="1" dirty="0"/>
+              <a:t> Pelajaran Agama Islam 50 </a:t>
+            </a:r>
+            <a:r>
+              <a:rPr lang="en-US" b="1" dirty="0" err="1"/>
+              <a:t>Siswa</a:t>
+            </a:r>
+            <a:endParaRPr lang="en-US" altLang="ko-KR" b="1" dirty="0"/>
+          </a:p>
+        </p:txBody>
+      </p:sp>
+      <p:sp>
+        <p:nvSpPr>
+          <p:cNvPr id="11" name="TextBox 10">
+            <a:extLst>
+              <a:ext uri="{FF2B5EF4-FFF2-40B4-BE49-F238E27FC236}">
+                <a16:creationId xmlns:a16="http://schemas.microsoft.com/office/drawing/2014/main" id="{E07A1541-4CD8-4EC6-8EE5-D91E55D9BF1D}"/>
+              </a:ext>
+            </a:extLst>
+          </p:cNvPr>
+          <p:cNvSpPr txBox="1"/>
+          <p:nvPr/>
+        </p:nvSpPr>
+        <p:spPr>
+          <a:xfrm>
+            <a:off x="827584" y="1532860"/>
+            <a:ext cx="4113410" cy="400110"/>
+          </a:xfrm>
+          <a:prstGeom prst="rect">
+            <a:avLst/>
+          </a:prstGeom>
+          <a:noFill/>
+        </p:spPr>
+        <p:txBody>
+          <a:bodyPr wrap="square" rtlCol="0" anchor="ctr">
+            <a:spAutoFit/>
+          </a:bodyPr>
+          <a:lstStyle/>
+          <a:p>
+            <a:pPr algn="just"/>
+            <a:r>
+              <a:rPr lang="en-US" sz="2000" dirty="0">
+                <a:sym typeface="Wingdings" panose="05000000000000000000" pitchFamily="2" charset="2"/>
+              </a:rPr>
+              <a:t> </a:t>
+            </a:r>
+            <a:r>
+              <a:rPr lang="en-US" sz="2000" dirty="0" err="1">
+                <a:sym typeface="Wingdings" panose="05000000000000000000" pitchFamily="2" charset="2"/>
+              </a:rPr>
+              <a:t>Mencari</a:t>
+            </a:r>
+            <a:r>
+              <a:rPr lang="en-US" sz="2000" dirty="0">
+                <a:sym typeface="Wingdings" panose="05000000000000000000" pitchFamily="2" charset="2"/>
+              </a:rPr>
+              <a:t> range</a:t>
+            </a:r>
+            <a:endParaRPr lang="en-US" altLang="ko-KR" sz="2000" dirty="0">
+              <a:solidFill>
+                <a:schemeClr val="tx1">
+                  <a:lumMod val="75000"/>
+                  <a:lumOff val="25000"/>
+                </a:schemeClr>
+              </a:solidFill>
+              <a:cs typeface="Arial" pitchFamily="34" charset="0"/>
+            </a:endParaRPr>
+          </a:p>
+        </p:txBody>
+      </p:sp>
+      <p:sp>
+        <p:nvSpPr>
+          <p:cNvPr id="4" name="Rectangle 3">
+            <a:extLst>
+              <a:ext uri="{FF2B5EF4-FFF2-40B4-BE49-F238E27FC236}">
+                <a16:creationId xmlns:a16="http://schemas.microsoft.com/office/drawing/2014/main" id="{258AB767-4D11-4212-9773-8B01D1959C1A}"/>
+              </a:ext>
+            </a:extLst>
+          </p:cNvPr>
+          <p:cNvSpPr/>
+          <p:nvPr/>
+        </p:nvSpPr>
+        <p:spPr>
+          <a:xfrm>
+            <a:off x="834919" y="2202418"/>
+            <a:ext cx="3344377" cy="307777"/>
+          </a:xfrm>
+          <a:prstGeom prst="rect">
+            <a:avLst/>
+          </a:prstGeom>
+        </p:spPr>
+        <p:txBody>
+          <a:bodyPr wrap="none">
+            <a:spAutoFit/>
+          </a:bodyPr>
+          <a:lstStyle/>
+          <a:p>
+            <a:r>
+              <a:rPr lang="en-US" sz="1400" dirty="0"/>
+              <a:t>Range = Data </a:t>
+            </a:r>
+            <a:r>
+              <a:rPr lang="en-US" sz="1400" dirty="0" err="1"/>
+              <a:t>Tertinggi</a:t>
+            </a:r>
+            <a:r>
+              <a:rPr lang="en-US" sz="1400" dirty="0"/>
+              <a:t> - Data </a:t>
+            </a:r>
+            <a:r>
+              <a:rPr lang="en-US" sz="1400" dirty="0" err="1"/>
+              <a:t>Terendah</a:t>
+            </a:r>
+            <a:endParaRPr lang="en-US" sz="1400" dirty="0"/>
+          </a:p>
+        </p:txBody>
+      </p:sp>
+      <p:sp>
+        <p:nvSpPr>
+          <p:cNvPr id="7" name="Rectangle 6">
+            <a:extLst>
+              <a:ext uri="{FF2B5EF4-FFF2-40B4-BE49-F238E27FC236}">
+                <a16:creationId xmlns:a16="http://schemas.microsoft.com/office/drawing/2014/main" id="{86673452-AD76-4BEF-8CF8-EF929918616C}"/>
+              </a:ext>
+            </a:extLst>
+          </p:cNvPr>
+          <p:cNvSpPr/>
+          <p:nvPr/>
+        </p:nvSpPr>
+        <p:spPr>
+          <a:xfrm>
+            <a:off x="856698" y="2687310"/>
+            <a:ext cx="1471878" cy="307777"/>
+          </a:xfrm>
+          <a:prstGeom prst="rect">
+            <a:avLst/>
+          </a:prstGeom>
+        </p:spPr>
+        <p:txBody>
+          <a:bodyPr wrap="none">
+            <a:spAutoFit/>
+          </a:bodyPr>
+          <a:lstStyle/>
+          <a:p>
+            <a:r>
+              <a:rPr lang="en-US" sz="1400" dirty="0"/>
+              <a:t>Range = 97 - 57</a:t>
+            </a:r>
+          </a:p>
+        </p:txBody>
+      </p:sp>
+      <p:sp>
+        <p:nvSpPr>
+          <p:cNvPr id="8" name="Rectangle 7">
+            <a:extLst>
+              <a:ext uri="{FF2B5EF4-FFF2-40B4-BE49-F238E27FC236}">
+                <a16:creationId xmlns:a16="http://schemas.microsoft.com/office/drawing/2014/main" id="{0D7986F6-BEA3-4B67-A65D-7C9029939501}"/>
+              </a:ext>
+            </a:extLst>
+          </p:cNvPr>
+          <p:cNvSpPr/>
+          <p:nvPr/>
+        </p:nvSpPr>
+        <p:spPr>
+          <a:xfrm>
+            <a:off x="856698" y="3172202"/>
+            <a:ext cx="1114408" cy="307777"/>
+          </a:xfrm>
+          <a:prstGeom prst="rect">
+            <a:avLst/>
+          </a:prstGeom>
+        </p:spPr>
+        <p:txBody>
+          <a:bodyPr wrap="none">
+            <a:spAutoFit/>
+          </a:bodyPr>
+          <a:lstStyle/>
+          <a:p>
+            <a:r>
+              <a:rPr lang="en-US" sz="1400" dirty="0"/>
+              <a:t>Range = 40</a:t>
+            </a:r>
+          </a:p>
+        </p:txBody>
+      </p:sp>
+    </p:spTree>
+    <p:extLst>
+      <p:ext uri="{BB962C8B-B14F-4D97-AF65-F5344CB8AC3E}">
+        <p14:creationId xmlns:p14="http://schemas.microsoft.com/office/powerpoint/2010/main" val="4050056847"/>
+      </p:ext>
+    </p:extLst>
+  </p:cSld>
+  <p:clrMapOvr>
+    <a:masterClrMapping/>
+  </p:clrMapOvr>
+</p:sld>
+</file>
+
+<file path=ppt/slides/slide16.xml><?xml version="1.0" encoding="utf-8"?>
+<p:sld xmlns:a="http://schemas.openxmlformats.org/drawingml/2006/main" xmlns:r="http://schemas.openxmlformats.org/officeDocument/2006/relationships" xmlns:p="http://schemas.openxmlformats.org/presentationml/2006/main">
+  <p:cSld>
+    <p:spTree>
+      <p:nvGrpSpPr>
+        <p:cNvPr id="1" name=""/>
+        <p:cNvGrpSpPr/>
+        <p:nvPr/>
+      </p:nvGrpSpPr>
+      <p:grpSpPr>
+        <a:xfrm>
+          <a:off x="0" y="0"/>
+          <a:ext cx="0" cy="0"/>
+          <a:chOff x="0" y="0"/>
+          <a:chExt cx="0" cy="0"/>
+        </a:xfrm>
+      </p:grpSpPr>
+      <p:sp>
+        <p:nvSpPr>
+          <p:cNvPr id="2" name="Text Placeholder 1"/>
+          <p:cNvSpPr>
+            <a:spLocks noGrp="1"/>
+          </p:cNvSpPr>
+          <p:nvPr>
+            <p:ph type="body" sz="quarter" idx="10"/>
+          </p:nvPr>
+        </p:nvSpPr>
+        <p:spPr/>
+        <p:txBody>
+          <a:bodyPr/>
+          <a:lstStyle/>
+          <a:p>
+            <a:r>
+              <a:rPr lang="en-US" altLang="ko-KR" dirty="0" err="1"/>
+              <a:t>Studi</a:t>
+            </a:r>
+            <a:r>
+              <a:rPr lang="en-US" altLang="ko-KR" dirty="0"/>
+              <a:t> </a:t>
+            </a:r>
+            <a:r>
+              <a:rPr lang="en-US" altLang="ko-KR" dirty="0" err="1"/>
+              <a:t>Kasus</a:t>
+            </a:r>
+            <a:endParaRPr lang="ko-KR" altLang="en-US" dirty="0"/>
+          </a:p>
+        </p:txBody>
+      </p:sp>
+      <p:sp>
+        <p:nvSpPr>
+          <p:cNvPr id="3" name="Text Placeholder 2"/>
+          <p:cNvSpPr>
+            <a:spLocks noGrp="1"/>
+          </p:cNvSpPr>
+          <p:nvPr>
+            <p:ph type="body" sz="quarter" idx="11"/>
+          </p:nvPr>
+        </p:nvSpPr>
+        <p:spPr/>
+        <p:txBody>
+          <a:bodyPr/>
+          <a:lstStyle/>
+          <a:p>
+            <a:pPr lvl="0"/>
+            <a:r>
+              <a:rPr lang="en-US" b="1" dirty="0" err="1"/>
+              <a:t>Tabel</a:t>
+            </a:r>
+            <a:r>
+              <a:rPr lang="en-US" b="1" dirty="0"/>
+              <a:t> data </a:t>
+            </a:r>
+            <a:r>
+              <a:rPr lang="en-US" b="1" dirty="0" err="1"/>
+              <a:t>nilai</a:t>
+            </a:r>
+            <a:r>
+              <a:rPr lang="en-US" b="1" dirty="0"/>
+              <a:t> </a:t>
+            </a:r>
+            <a:r>
+              <a:rPr lang="en-US" b="1" dirty="0" err="1"/>
+              <a:t>ujian</a:t>
+            </a:r>
+            <a:r>
+              <a:rPr lang="en-US" b="1" dirty="0"/>
+              <a:t> Pelajaran Agama Islam 50 </a:t>
+            </a:r>
+            <a:r>
+              <a:rPr lang="en-US" b="1" dirty="0" err="1"/>
+              <a:t>Siswa</a:t>
+            </a:r>
+            <a:endParaRPr lang="en-US" altLang="ko-KR" b="1" dirty="0"/>
+          </a:p>
+        </p:txBody>
+      </p:sp>
+      <p:sp>
+        <p:nvSpPr>
+          <p:cNvPr id="11" name="TextBox 10">
+            <a:extLst>
+              <a:ext uri="{FF2B5EF4-FFF2-40B4-BE49-F238E27FC236}">
+                <a16:creationId xmlns:a16="http://schemas.microsoft.com/office/drawing/2014/main" id="{E07A1541-4CD8-4EC6-8EE5-D91E55D9BF1D}"/>
+              </a:ext>
+            </a:extLst>
+          </p:cNvPr>
+          <p:cNvSpPr txBox="1"/>
+          <p:nvPr/>
+        </p:nvSpPr>
+        <p:spPr>
+          <a:xfrm>
+            <a:off x="827584" y="1532860"/>
+            <a:ext cx="4113410" cy="400110"/>
+          </a:xfrm>
+          <a:prstGeom prst="rect">
+            <a:avLst/>
+          </a:prstGeom>
+          <a:noFill/>
+        </p:spPr>
+        <p:txBody>
+          <a:bodyPr wrap="square" rtlCol="0" anchor="ctr">
+            <a:spAutoFit/>
+          </a:bodyPr>
+          <a:lstStyle/>
+          <a:p>
+            <a:pPr algn="just"/>
+            <a:r>
+              <a:rPr lang="en-US" sz="2000" dirty="0">
+                <a:sym typeface="Wingdings" panose="05000000000000000000" pitchFamily="2" charset="2"/>
+              </a:rPr>
+              <a:t> </a:t>
+            </a:r>
+            <a:r>
+              <a:rPr lang="en-US" sz="2000" dirty="0" err="1">
+                <a:sym typeface="Wingdings" panose="05000000000000000000" pitchFamily="2" charset="2"/>
+              </a:rPr>
+              <a:t>Membuat</a:t>
+            </a:r>
+            <a:r>
+              <a:rPr lang="en-US" sz="2000" dirty="0">
+                <a:sym typeface="Wingdings" panose="05000000000000000000" pitchFamily="2" charset="2"/>
+              </a:rPr>
+              <a:t> </a:t>
+            </a:r>
+            <a:r>
+              <a:rPr lang="en-US" sz="2000" dirty="0" err="1">
+                <a:sym typeface="Wingdings" panose="05000000000000000000" pitchFamily="2" charset="2"/>
+              </a:rPr>
+              <a:t>tabel</a:t>
+            </a:r>
+            <a:r>
+              <a:rPr lang="en-US" sz="2000" dirty="0">
+                <a:sym typeface="Wingdings" panose="05000000000000000000" pitchFamily="2" charset="2"/>
+              </a:rPr>
+              <a:t> </a:t>
+            </a:r>
+            <a:r>
+              <a:rPr lang="en-US" sz="2000" dirty="0" err="1">
+                <a:sym typeface="Wingdings" panose="05000000000000000000" pitchFamily="2" charset="2"/>
+              </a:rPr>
+              <a:t>frekuensi</a:t>
+            </a:r>
+            <a:endParaRPr lang="en-US" altLang="ko-KR" sz="2000" dirty="0">
+              <a:solidFill>
+                <a:schemeClr val="tx1">
+                  <a:lumMod val="75000"/>
+                  <a:lumOff val="25000"/>
+                </a:schemeClr>
+              </a:solidFill>
+              <a:cs typeface="Arial" pitchFamily="34" charset="0"/>
+            </a:endParaRPr>
+          </a:p>
+        </p:txBody>
+      </p:sp>
+      <p:sp>
+        <p:nvSpPr>
+          <p:cNvPr id="6" name="Rectangle 5">
+            <a:extLst>
+              <a:ext uri="{FF2B5EF4-FFF2-40B4-BE49-F238E27FC236}">
+                <a16:creationId xmlns:a16="http://schemas.microsoft.com/office/drawing/2014/main" id="{F237340B-E26D-453F-96B6-19FBA47AB6C9}"/>
+              </a:ext>
+            </a:extLst>
+          </p:cNvPr>
+          <p:cNvSpPr/>
+          <p:nvPr/>
+        </p:nvSpPr>
+        <p:spPr>
+          <a:xfrm>
+            <a:off x="971600" y="2108924"/>
+            <a:ext cx="3223959" cy="369332"/>
+          </a:xfrm>
+          <a:prstGeom prst="rect">
+            <a:avLst/>
+          </a:prstGeom>
+        </p:spPr>
+        <p:txBody>
+          <a:bodyPr wrap="none">
+            <a:spAutoFit/>
+          </a:bodyPr>
+          <a:lstStyle/>
+          <a:p>
+            <a:r>
+              <a:rPr lang="pt-BR" dirty="0"/>
+              <a:t>Jumlah Kelas = 1 + 3.3 Log N</a:t>
+            </a:r>
+          </a:p>
+        </p:txBody>
+      </p:sp>
+      <p:sp>
+        <p:nvSpPr>
+          <p:cNvPr id="9" name="Rectangle 8">
+            <a:extLst>
+              <a:ext uri="{FF2B5EF4-FFF2-40B4-BE49-F238E27FC236}">
+                <a16:creationId xmlns:a16="http://schemas.microsoft.com/office/drawing/2014/main" id="{BA473A3C-ED49-4429-9F30-FA31E879460B}"/>
+              </a:ext>
+            </a:extLst>
+          </p:cNvPr>
+          <p:cNvSpPr/>
+          <p:nvPr/>
+        </p:nvSpPr>
+        <p:spPr>
+          <a:xfrm>
+            <a:off x="2434938" y="2504428"/>
+            <a:ext cx="2146742" cy="369332"/>
+          </a:xfrm>
+          <a:prstGeom prst="rect">
+            <a:avLst/>
+          </a:prstGeom>
+        </p:spPr>
+        <p:txBody>
+          <a:bodyPr wrap="none">
+            <a:spAutoFit/>
+          </a:bodyPr>
+          <a:lstStyle/>
+          <a:p>
+            <a:r>
+              <a:rPr lang="en-US" dirty="0"/>
+              <a:t>= 1+ 3.3 * LOG(50)</a:t>
+            </a:r>
+          </a:p>
+        </p:txBody>
+      </p:sp>
+      <p:sp>
+        <p:nvSpPr>
+          <p:cNvPr id="10" name="Rectangle 9">
+            <a:extLst>
+              <a:ext uri="{FF2B5EF4-FFF2-40B4-BE49-F238E27FC236}">
+                <a16:creationId xmlns:a16="http://schemas.microsoft.com/office/drawing/2014/main" id="{E04428B3-CC93-4A41-86BB-EA95B93907AF}"/>
+              </a:ext>
+            </a:extLst>
+          </p:cNvPr>
+          <p:cNvSpPr/>
+          <p:nvPr/>
+        </p:nvSpPr>
+        <p:spPr>
+          <a:xfrm>
+            <a:off x="2481999" y="2899932"/>
+            <a:ext cx="1729961" cy="369332"/>
+          </a:xfrm>
+          <a:prstGeom prst="rect">
+            <a:avLst/>
+          </a:prstGeom>
+        </p:spPr>
+        <p:txBody>
+          <a:bodyPr wrap="none">
+            <a:spAutoFit/>
+          </a:bodyPr>
+          <a:lstStyle/>
+          <a:p>
+            <a:r>
+              <a:rPr lang="en-US" dirty="0"/>
+              <a:t>= 6.606601014</a:t>
+            </a:r>
+          </a:p>
+        </p:txBody>
+      </p:sp>
+      <p:sp>
+        <p:nvSpPr>
+          <p:cNvPr id="12" name="Rectangle 11">
+            <a:extLst>
+              <a:ext uri="{FF2B5EF4-FFF2-40B4-BE49-F238E27FC236}">
+                <a16:creationId xmlns:a16="http://schemas.microsoft.com/office/drawing/2014/main" id="{8BC96213-C214-4B6D-8EB3-E2A6148FCB14}"/>
+              </a:ext>
+            </a:extLst>
+          </p:cNvPr>
+          <p:cNvSpPr/>
+          <p:nvPr/>
+        </p:nvSpPr>
+        <p:spPr>
+          <a:xfrm>
+            <a:off x="4788024" y="2100798"/>
+            <a:ext cx="3525324" cy="369332"/>
+          </a:xfrm>
+          <a:prstGeom prst="rect">
+            <a:avLst/>
+          </a:prstGeom>
+        </p:spPr>
+        <p:txBody>
+          <a:bodyPr wrap="none">
+            <a:spAutoFit/>
+          </a:bodyPr>
+          <a:lstStyle/>
+          <a:p>
+            <a:r>
+              <a:rPr lang="en-US" dirty="0"/>
+              <a:t>Interval = Range / </a:t>
+            </a:r>
+            <a:r>
+              <a:rPr lang="en-US" dirty="0" err="1"/>
+              <a:t>Jumlah</a:t>
+            </a:r>
+            <a:r>
+              <a:rPr lang="en-US" dirty="0"/>
+              <a:t> Kelas </a:t>
+            </a:r>
+          </a:p>
+        </p:txBody>
+      </p:sp>
+      <p:sp>
+        <p:nvSpPr>
+          <p:cNvPr id="13" name="Rectangle 12">
+            <a:extLst>
+              <a:ext uri="{FF2B5EF4-FFF2-40B4-BE49-F238E27FC236}">
+                <a16:creationId xmlns:a16="http://schemas.microsoft.com/office/drawing/2014/main" id="{84CC05AE-C306-41F5-A186-8A3741B05BF4}"/>
+              </a:ext>
+            </a:extLst>
+          </p:cNvPr>
+          <p:cNvSpPr/>
+          <p:nvPr/>
+        </p:nvSpPr>
+        <p:spPr>
+          <a:xfrm>
+            <a:off x="2511038" y="3260552"/>
+            <a:ext cx="511679" cy="369332"/>
+          </a:xfrm>
+          <a:prstGeom prst="rect">
+            <a:avLst/>
+          </a:prstGeom>
+        </p:spPr>
+        <p:txBody>
+          <a:bodyPr wrap="none">
+            <a:spAutoFit/>
+          </a:bodyPr>
+          <a:lstStyle/>
+          <a:p>
+            <a:r>
+              <a:rPr lang="en-US" dirty="0"/>
+              <a:t>= 7</a:t>
+            </a:r>
+          </a:p>
+        </p:txBody>
+      </p:sp>
+      <p:sp>
+        <p:nvSpPr>
+          <p:cNvPr id="14" name="Rectangle 13">
+            <a:extLst>
+              <a:ext uri="{FF2B5EF4-FFF2-40B4-BE49-F238E27FC236}">
+                <a16:creationId xmlns:a16="http://schemas.microsoft.com/office/drawing/2014/main" id="{7F8DADD7-B16C-496C-85D8-02134F8D95C6}"/>
+              </a:ext>
+            </a:extLst>
+          </p:cNvPr>
+          <p:cNvSpPr/>
+          <p:nvPr/>
+        </p:nvSpPr>
+        <p:spPr>
+          <a:xfrm>
+            <a:off x="5611621" y="2515630"/>
+            <a:ext cx="960519" cy="369332"/>
+          </a:xfrm>
+          <a:prstGeom prst="rect">
+            <a:avLst/>
+          </a:prstGeom>
+        </p:spPr>
+        <p:txBody>
+          <a:bodyPr wrap="none">
+            <a:spAutoFit/>
+          </a:bodyPr>
+          <a:lstStyle/>
+          <a:p>
+            <a:r>
+              <a:rPr lang="en-US" dirty="0"/>
+              <a:t>= 40 / 7</a:t>
+            </a:r>
+          </a:p>
+        </p:txBody>
+      </p:sp>
+      <p:sp>
+        <p:nvSpPr>
+          <p:cNvPr id="15" name="Rectangle 14">
+            <a:extLst>
+              <a:ext uri="{FF2B5EF4-FFF2-40B4-BE49-F238E27FC236}">
+                <a16:creationId xmlns:a16="http://schemas.microsoft.com/office/drawing/2014/main" id="{B5FC5C20-D51E-4C57-B788-01C1AE70DEF6}"/>
+              </a:ext>
+            </a:extLst>
+          </p:cNvPr>
+          <p:cNvSpPr/>
+          <p:nvPr/>
+        </p:nvSpPr>
+        <p:spPr>
+          <a:xfrm>
+            <a:off x="5611621" y="2899932"/>
+            <a:ext cx="1409360" cy="369332"/>
+          </a:xfrm>
+          <a:prstGeom prst="rect">
+            <a:avLst/>
+          </a:prstGeom>
+        </p:spPr>
+        <p:txBody>
+          <a:bodyPr wrap="none">
+            <a:spAutoFit/>
+          </a:bodyPr>
+          <a:lstStyle/>
+          <a:p>
+            <a:r>
+              <a:rPr lang="en-US" dirty="0"/>
+              <a:t>= 6.064641 </a:t>
+            </a:r>
+          </a:p>
+        </p:txBody>
+      </p:sp>
+      <p:sp>
+        <p:nvSpPr>
+          <p:cNvPr id="16" name="Rectangle 15">
+            <a:extLst>
+              <a:ext uri="{FF2B5EF4-FFF2-40B4-BE49-F238E27FC236}">
+                <a16:creationId xmlns:a16="http://schemas.microsoft.com/office/drawing/2014/main" id="{9696E6A1-B03F-45CC-9E02-1C5D3BBC3DE8}"/>
+              </a:ext>
+            </a:extLst>
+          </p:cNvPr>
+          <p:cNvSpPr/>
+          <p:nvPr/>
+        </p:nvSpPr>
+        <p:spPr>
+          <a:xfrm>
+            <a:off x="5611621" y="3284234"/>
+            <a:ext cx="575799" cy="369332"/>
+          </a:xfrm>
+          <a:prstGeom prst="rect">
+            <a:avLst/>
+          </a:prstGeom>
+        </p:spPr>
+        <p:txBody>
+          <a:bodyPr wrap="none">
+            <a:spAutoFit/>
+          </a:bodyPr>
+          <a:lstStyle/>
+          <a:p>
+            <a:r>
+              <a:rPr lang="en-US" dirty="0"/>
+              <a:t>= 6 </a:t>
+            </a:r>
+          </a:p>
+        </p:txBody>
+      </p:sp>
+    </p:spTree>
+    <p:extLst>
+      <p:ext uri="{BB962C8B-B14F-4D97-AF65-F5344CB8AC3E}">
+        <p14:creationId xmlns:p14="http://schemas.microsoft.com/office/powerpoint/2010/main" val="3225904654"/>
+      </p:ext>
+    </p:extLst>
+  </p:cSld>
+  <p:clrMapOvr>
+    <a:masterClrMapping/>
+  </p:clrMapOvr>
+</p:sld>
+</file>
+
+<file path=ppt/slides/slide17.xml><?xml version="1.0" encoding="utf-8"?>
+<p:sld xmlns:a="http://schemas.openxmlformats.org/drawingml/2006/main" xmlns:r="http://schemas.openxmlformats.org/officeDocument/2006/relationships" xmlns:p="http://schemas.openxmlformats.org/presentationml/2006/main">
+  <p:cSld>
+    <p:spTree>
+      <p:nvGrpSpPr>
+        <p:cNvPr id="1" name=""/>
+        <p:cNvGrpSpPr/>
+        <p:nvPr/>
+      </p:nvGrpSpPr>
+      <p:grpSpPr>
+        <a:xfrm>
+          <a:off x="0" y="0"/>
+          <a:ext cx="0" cy="0"/>
+          <a:chOff x="0" y="0"/>
+          <a:chExt cx="0" cy="0"/>
+        </a:xfrm>
+      </p:grpSpPr>
+      <p:sp>
+        <p:nvSpPr>
+          <p:cNvPr id="2" name="Text Placeholder 1"/>
+          <p:cNvSpPr>
+            <a:spLocks noGrp="1"/>
+          </p:cNvSpPr>
+          <p:nvPr>
+            <p:ph type="body" sz="quarter" idx="10"/>
+          </p:nvPr>
+        </p:nvSpPr>
+        <p:spPr/>
+        <p:txBody>
+          <a:bodyPr/>
+          <a:lstStyle/>
+          <a:p>
+            <a:r>
+              <a:rPr lang="en-US" altLang="ko-KR" dirty="0" err="1"/>
+              <a:t>Studi</a:t>
+            </a:r>
+            <a:r>
+              <a:rPr lang="en-US" altLang="ko-KR" dirty="0"/>
+              <a:t> </a:t>
+            </a:r>
+            <a:r>
+              <a:rPr lang="en-US" altLang="ko-KR" dirty="0" err="1"/>
+              <a:t>Kasus</a:t>
+            </a:r>
+            <a:endParaRPr lang="ko-KR" altLang="en-US" dirty="0"/>
+          </a:p>
+        </p:txBody>
+      </p:sp>
+      <p:sp>
+        <p:nvSpPr>
+          <p:cNvPr id="3" name="Text Placeholder 2"/>
+          <p:cNvSpPr>
+            <a:spLocks noGrp="1"/>
+          </p:cNvSpPr>
+          <p:nvPr>
+            <p:ph type="body" sz="quarter" idx="11"/>
+          </p:nvPr>
+        </p:nvSpPr>
+        <p:spPr/>
+        <p:txBody>
+          <a:bodyPr/>
+          <a:lstStyle/>
+          <a:p>
+            <a:pPr lvl="0"/>
+            <a:r>
+              <a:rPr lang="en-US" b="1" dirty="0" err="1"/>
+              <a:t>Tabel</a:t>
+            </a:r>
+            <a:r>
+              <a:rPr lang="en-US" b="1" dirty="0"/>
+              <a:t> data </a:t>
+            </a:r>
+            <a:r>
+              <a:rPr lang="en-US" b="1" dirty="0" err="1"/>
+              <a:t>nilai</a:t>
+            </a:r>
+            <a:r>
+              <a:rPr lang="en-US" b="1" dirty="0"/>
+              <a:t> </a:t>
+            </a:r>
+            <a:r>
+              <a:rPr lang="en-US" b="1" dirty="0" err="1"/>
+              <a:t>ujian</a:t>
+            </a:r>
+            <a:r>
+              <a:rPr lang="en-US" b="1" dirty="0"/>
+              <a:t> Pelajaran Agama Islam 50 </a:t>
+            </a:r>
+            <a:r>
+              <a:rPr lang="en-US" b="1" dirty="0" err="1"/>
+              <a:t>Siswa</a:t>
+            </a:r>
+            <a:endParaRPr lang="en-US" altLang="ko-KR" b="1" dirty="0"/>
+          </a:p>
+        </p:txBody>
+      </p:sp>
+      <p:sp>
+        <p:nvSpPr>
+          <p:cNvPr id="11" name="TextBox 10">
+            <a:extLst>
+              <a:ext uri="{FF2B5EF4-FFF2-40B4-BE49-F238E27FC236}">
+                <a16:creationId xmlns:a16="http://schemas.microsoft.com/office/drawing/2014/main" id="{E07A1541-4CD8-4EC6-8EE5-D91E55D9BF1D}"/>
+              </a:ext>
+            </a:extLst>
+          </p:cNvPr>
+          <p:cNvSpPr txBox="1"/>
+          <p:nvPr/>
+        </p:nvSpPr>
+        <p:spPr>
+          <a:xfrm>
+            <a:off x="827584" y="1532860"/>
+            <a:ext cx="4113410" cy="400110"/>
+          </a:xfrm>
+          <a:prstGeom prst="rect">
+            <a:avLst/>
+          </a:prstGeom>
+          <a:noFill/>
+        </p:spPr>
+        <p:txBody>
+          <a:bodyPr wrap="square" rtlCol="0" anchor="ctr">
+            <a:spAutoFit/>
+          </a:bodyPr>
+          <a:lstStyle/>
+          <a:p>
+            <a:pPr algn="just"/>
+            <a:r>
+              <a:rPr lang="en-US" sz="2000" dirty="0">
+                <a:sym typeface="Wingdings" panose="05000000000000000000" pitchFamily="2" charset="2"/>
+              </a:rPr>
+              <a:t> </a:t>
+            </a:r>
+            <a:r>
+              <a:rPr lang="en-US" sz="2000" dirty="0" err="1">
+                <a:sym typeface="Wingdings" panose="05000000000000000000" pitchFamily="2" charset="2"/>
+              </a:rPr>
+              <a:t>Membuat</a:t>
+            </a:r>
+            <a:r>
+              <a:rPr lang="en-US" sz="2000" dirty="0">
+                <a:sym typeface="Wingdings" panose="05000000000000000000" pitchFamily="2" charset="2"/>
+              </a:rPr>
+              <a:t> </a:t>
+            </a:r>
+            <a:r>
+              <a:rPr lang="en-US" sz="2000" dirty="0" err="1">
+                <a:sym typeface="Wingdings" panose="05000000000000000000" pitchFamily="2" charset="2"/>
+              </a:rPr>
+              <a:t>tabel</a:t>
+            </a:r>
+            <a:r>
+              <a:rPr lang="en-US" sz="2000" dirty="0">
+                <a:sym typeface="Wingdings" panose="05000000000000000000" pitchFamily="2" charset="2"/>
+              </a:rPr>
+              <a:t> </a:t>
+            </a:r>
+            <a:r>
+              <a:rPr lang="en-US" sz="2000" dirty="0" err="1">
+                <a:sym typeface="Wingdings" panose="05000000000000000000" pitchFamily="2" charset="2"/>
+              </a:rPr>
+              <a:t>frekuensi</a:t>
+            </a:r>
+            <a:endParaRPr lang="en-US" altLang="ko-KR" sz="2000" dirty="0">
+              <a:solidFill>
+                <a:schemeClr val="tx1">
+                  <a:lumMod val="75000"/>
+                  <a:lumOff val="25000"/>
+                </a:schemeClr>
+              </a:solidFill>
+              <a:cs typeface="Arial" pitchFamily="34" charset="0"/>
+            </a:endParaRPr>
+          </a:p>
+        </p:txBody>
+      </p:sp>
+      <p:graphicFrame>
+        <p:nvGraphicFramePr>
+          <p:cNvPr id="5" name="Table 4">
+            <a:extLst>
+              <a:ext uri="{FF2B5EF4-FFF2-40B4-BE49-F238E27FC236}">
+                <a16:creationId xmlns:a16="http://schemas.microsoft.com/office/drawing/2014/main" id="{53D6E709-A17A-44FC-9447-B519C65FAFC9}"/>
+              </a:ext>
+            </a:extLst>
+          </p:cNvPr>
+          <p:cNvGraphicFramePr>
+            <a:graphicFrameLocks noGrp="1"/>
+          </p:cNvGraphicFramePr>
+          <p:nvPr>
+            <p:extLst>
+              <p:ext uri="{D42A27DB-BD31-4B8C-83A1-F6EECF244321}">
+                <p14:modId xmlns:p14="http://schemas.microsoft.com/office/powerpoint/2010/main" val="1824770103"/>
+              </p:ext>
+            </p:extLst>
+          </p:nvPr>
+        </p:nvGraphicFramePr>
+        <p:xfrm>
+          <a:off x="1270831" y="2227681"/>
+          <a:ext cx="3226916" cy="1965699"/>
+        </p:xfrm>
+        <a:graphic>
+          <a:graphicData uri="http://schemas.openxmlformats.org/drawingml/2006/table">
+            <a:tbl>
+              <a:tblPr>
+                <a:tableStyleId>{616DA210-FB5B-4158-B5E0-FEB733F419BA}</a:tableStyleId>
+              </a:tblPr>
+              <a:tblGrid>
+                <a:gridCol w="1597483">
+                  <a:extLst>
+                    <a:ext uri="{9D8B030D-6E8A-4147-A177-3AD203B41FA5}">
+                      <a16:colId xmlns:a16="http://schemas.microsoft.com/office/drawing/2014/main" val="2383773264"/>
+                    </a:ext>
+                  </a:extLst>
+                </a:gridCol>
+                <a:gridCol w="1629433">
+                  <a:extLst>
+                    <a:ext uri="{9D8B030D-6E8A-4147-A177-3AD203B41FA5}">
+                      <a16:colId xmlns:a16="http://schemas.microsoft.com/office/drawing/2014/main" val="103448515"/>
+                    </a:ext>
+                  </a:extLst>
+                </a:gridCol>
+              </a:tblGrid>
+              <a:tr h="218411">
+                <a:tc>
+                  <a:txBody>
+                    <a:bodyPr/>
+                    <a:lstStyle/>
+                    <a:p>
+                      <a:pPr algn="ctr" fontAlgn="ctr"/>
+                      <a:r>
+                        <a:rPr lang="en-US" sz="1100" b="1" u="none" strike="noStrike" dirty="0" err="1">
+                          <a:effectLst/>
+                        </a:rPr>
+                        <a:t>Periode</a:t>
+                      </a:r>
+                      <a:endParaRPr lang="en-US" sz="1100" b="1" i="0" u="none" strike="noStrike" dirty="0">
+                        <a:solidFill>
+                          <a:srgbClr val="000000"/>
+                        </a:solidFill>
+                        <a:effectLst/>
+                        <a:latin typeface="Calibri" panose="020F0502020204030204" pitchFamily="34" charset="0"/>
+                      </a:endParaRPr>
+                    </a:p>
+                  </a:txBody>
+                  <a:tcPr marL="9525" marR="9525" marT="9525" marB="0" anchor="ctr"/>
+                </a:tc>
+                <a:tc>
+                  <a:txBody>
+                    <a:bodyPr/>
+                    <a:lstStyle/>
+                    <a:p>
+                      <a:pPr algn="ctr" fontAlgn="ctr"/>
+                      <a:r>
+                        <a:rPr lang="en-US" sz="1100" b="1" u="none" strike="noStrike" dirty="0" err="1">
+                          <a:effectLst/>
+                        </a:rPr>
+                        <a:t>Frekuensi</a:t>
+                      </a:r>
+                      <a:endParaRPr lang="en-US" sz="1100" b="1" i="0" u="none" strike="noStrike" dirty="0">
+                        <a:solidFill>
+                          <a:srgbClr val="000000"/>
+                        </a:solidFill>
+                        <a:effectLst/>
+                        <a:latin typeface="Calibri" panose="020F0502020204030204" pitchFamily="34" charset="0"/>
+                      </a:endParaRPr>
+                    </a:p>
+                  </a:txBody>
+                  <a:tcPr marL="9525" marR="9525" marT="9525" marB="0" anchor="ctr"/>
+                </a:tc>
+                <a:extLst>
+                  <a:ext uri="{0D108BD9-81ED-4DB2-BD59-A6C34878D82A}">
+                    <a16:rowId xmlns:a16="http://schemas.microsoft.com/office/drawing/2014/main" val="1446644676"/>
+                  </a:ext>
+                </a:extLst>
+              </a:tr>
+              <a:tr h="218411">
+                <a:tc>
+                  <a:txBody>
+                    <a:bodyPr/>
+                    <a:lstStyle/>
+                    <a:p>
+                      <a:pPr algn="ctr" fontAlgn="ctr"/>
+                      <a:r>
+                        <a:rPr lang="en-US" sz="1100" u="none" strike="noStrike">
+                          <a:effectLst/>
+                        </a:rPr>
+                        <a:t>57 - 62</a:t>
+                      </a:r>
+                      <a:endParaRPr lang="en-US" sz="1100" b="0" i="0" u="none" strike="noStrike">
+                        <a:solidFill>
+                          <a:srgbClr val="000000"/>
+                        </a:solidFill>
+                        <a:effectLst/>
+                        <a:latin typeface="Calibri" panose="020F0502020204030204" pitchFamily="34" charset="0"/>
+                      </a:endParaRPr>
+                    </a:p>
+                  </a:txBody>
+                  <a:tcPr marL="9525" marR="9525" marT="9525" marB="0" anchor="ctr"/>
+                </a:tc>
+                <a:tc>
+                  <a:txBody>
+                    <a:bodyPr/>
+                    <a:lstStyle/>
+                    <a:p>
+                      <a:pPr algn="ctr" fontAlgn="ctr"/>
+                      <a:r>
+                        <a:rPr lang="en-US" sz="1100" u="none" strike="noStrike">
+                          <a:effectLst/>
+                        </a:rPr>
+                        <a:t>3</a:t>
+                      </a:r>
+                      <a:endParaRPr lang="en-US" sz="1100" b="0" i="0" u="none" strike="noStrike">
+                        <a:solidFill>
+                          <a:srgbClr val="000000"/>
+                        </a:solidFill>
+                        <a:effectLst/>
+                        <a:latin typeface="Calibri" panose="020F0502020204030204" pitchFamily="34" charset="0"/>
+                      </a:endParaRPr>
+                    </a:p>
+                  </a:txBody>
+                  <a:tcPr marL="9525" marR="9525" marT="9525" marB="0" anchor="ctr"/>
+                </a:tc>
+                <a:extLst>
+                  <a:ext uri="{0D108BD9-81ED-4DB2-BD59-A6C34878D82A}">
+                    <a16:rowId xmlns:a16="http://schemas.microsoft.com/office/drawing/2014/main" val="2087756222"/>
+                  </a:ext>
+                </a:extLst>
+              </a:tr>
+              <a:tr h="218411">
+                <a:tc>
+                  <a:txBody>
+                    <a:bodyPr/>
+                    <a:lstStyle/>
+                    <a:p>
+                      <a:pPr algn="ctr" fontAlgn="ctr"/>
+                      <a:r>
+                        <a:rPr lang="en-US" sz="1100" u="none" strike="noStrike">
+                          <a:effectLst/>
+                        </a:rPr>
+                        <a:t>63 - 68</a:t>
+                      </a:r>
+                      <a:endParaRPr lang="en-US" sz="1100" b="0" i="0" u="none" strike="noStrike">
+                        <a:solidFill>
+                          <a:srgbClr val="000000"/>
+                        </a:solidFill>
+                        <a:effectLst/>
+                        <a:latin typeface="Calibri" panose="020F0502020204030204" pitchFamily="34" charset="0"/>
+                      </a:endParaRPr>
+                    </a:p>
+                  </a:txBody>
+                  <a:tcPr marL="9525" marR="9525" marT="9525" marB="0" anchor="ctr"/>
+                </a:tc>
+                <a:tc>
+                  <a:txBody>
+                    <a:bodyPr/>
+                    <a:lstStyle/>
+                    <a:p>
+                      <a:pPr algn="ctr" fontAlgn="ctr"/>
+                      <a:r>
+                        <a:rPr lang="en-US" sz="1100" u="none" strike="noStrike">
+                          <a:effectLst/>
+                        </a:rPr>
+                        <a:t>2</a:t>
+                      </a:r>
+                      <a:endParaRPr lang="en-US" sz="1100" b="0" i="0" u="none" strike="noStrike">
+                        <a:solidFill>
+                          <a:srgbClr val="000000"/>
+                        </a:solidFill>
+                        <a:effectLst/>
+                        <a:latin typeface="Calibri" panose="020F0502020204030204" pitchFamily="34" charset="0"/>
+                      </a:endParaRPr>
+                    </a:p>
+                  </a:txBody>
+                  <a:tcPr marL="9525" marR="9525" marT="9525" marB="0" anchor="ctr"/>
+                </a:tc>
+                <a:extLst>
+                  <a:ext uri="{0D108BD9-81ED-4DB2-BD59-A6C34878D82A}">
+                    <a16:rowId xmlns:a16="http://schemas.microsoft.com/office/drawing/2014/main" val="1455682934"/>
+                  </a:ext>
+                </a:extLst>
+              </a:tr>
+              <a:tr h="218411">
+                <a:tc>
+                  <a:txBody>
+                    <a:bodyPr/>
+                    <a:lstStyle/>
+                    <a:p>
+                      <a:pPr algn="ctr" fontAlgn="ctr"/>
+                      <a:r>
+                        <a:rPr lang="en-US" sz="1100" u="none" strike="noStrike">
+                          <a:effectLst/>
+                        </a:rPr>
+                        <a:t>69 - 74</a:t>
+                      </a:r>
+                      <a:endParaRPr lang="en-US" sz="1100" b="0" i="0" u="none" strike="noStrike">
+                        <a:solidFill>
+                          <a:srgbClr val="000000"/>
+                        </a:solidFill>
+                        <a:effectLst/>
+                        <a:latin typeface="Calibri" panose="020F0502020204030204" pitchFamily="34" charset="0"/>
+                      </a:endParaRPr>
+                    </a:p>
+                  </a:txBody>
+                  <a:tcPr marL="9525" marR="9525" marT="9525" marB="0" anchor="ctr"/>
+                </a:tc>
+                <a:tc>
+                  <a:txBody>
+                    <a:bodyPr/>
+                    <a:lstStyle/>
+                    <a:p>
+                      <a:pPr algn="ctr" fontAlgn="ctr"/>
+                      <a:r>
+                        <a:rPr lang="en-US" sz="1100" u="none" strike="noStrike" dirty="0">
+                          <a:effectLst/>
+                        </a:rPr>
+                        <a:t>2</a:t>
+                      </a:r>
+                      <a:endParaRPr lang="en-US" sz="1100" b="0" i="0" u="none" strike="noStrike" dirty="0">
+                        <a:solidFill>
+                          <a:srgbClr val="000000"/>
+                        </a:solidFill>
+                        <a:effectLst/>
+                        <a:latin typeface="Calibri" panose="020F0502020204030204" pitchFamily="34" charset="0"/>
+                      </a:endParaRPr>
+                    </a:p>
+                  </a:txBody>
+                  <a:tcPr marL="9525" marR="9525" marT="9525" marB="0" anchor="ctr"/>
+                </a:tc>
+                <a:extLst>
+                  <a:ext uri="{0D108BD9-81ED-4DB2-BD59-A6C34878D82A}">
+                    <a16:rowId xmlns:a16="http://schemas.microsoft.com/office/drawing/2014/main" val="3240500873"/>
+                  </a:ext>
+                </a:extLst>
+              </a:tr>
+              <a:tr h="218411">
+                <a:tc>
+                  <a:txBody>
+                    <a:bodyPr/>
+                    <a:lstStyle/>
+                    <a:p>
+                      <a:pPr algn="ctr" fontAlgn="ctr"/>
+                      <a:r>
+                        <a:rPr lang="en-US" sz="1100" u="none" strike="noStrike">
+                          <a:effectLst/>
+                        </a:rPr>
+                        <a:t>75 - 80</a:t>
+                      </a:r>
+                      <a:endParaRPr lang="en-US" sz="1100" b="0" i="0" u="none" strike="noStrike">
+                        <a:solidFill>
+                          <a:srgbClr val="000000"/>
+                        </a:solidFill>
+                        <a:effectLst/>
+                        <a:latin typeface="Calibri" panose="020F0502020204030204" pitchFamily="34" charset="0"/>
+                      </a:endParaRPr>
+                    </a:p>
+                  </a:txBody>
+                  <a:tcPr marL="9525" marR="9525" marT="9525" marB="0" anchor="ctr"/>
+                </a:tc>
+                <a:tc>
+                  <a:txBody>
+                    <a:bodyPr/>
+                    <a:lstStyle/>
+                    <a:p>
+                      <a:pPr algn="ctr" fontAlgn="ctr"/>
+                      <a:r>
+                        <a:rPr lang="en-US" sz="1000" u="none" strike="noStrike">
+                          <a:effectLst/>
+                        </a:rPr>
+                        <a:t>4</a:t>
+                      </a:r>
+                      <a:endParaRPr lang="en-US" sz="1000" b="0" i="0" u="none" strike="noStrike">
+                        <a:solidFill>
+                          <a:srgbClr val="000000"/>
+                        </a:solidFill>
+                        <a:effectLst/>
+                        <a:latin typeface="Arial Narrow" panose="020B0606020202030204" pitchFamily="34" charset="0"/>
+                      </a:endParaRPr>
+                    </a:p>
+                  </a:txBody>
+                  <a:tcPr marL="9525" marR="9525" marT="9525" marB="0" anchor="ctr"/>
+                </a:tc>
+                <a:extLst>
+                  <a:ext uri="{0D108BD9-81ED-4DB2-BD59-A6C34878D82A}">
+                    <a16:rowId xmlns:a16="http://schemas.microsoft.com/office/drawing/2014/main" val="1362496416"/>
+                  </a:ext>
+                </a:extLst>
+              </a:tr>
+              <a:tr h="218411">
+                <a:tc>
+                  <a:txBody>
+                    <a:bodyPr/>
+                    <a:lstStyle/>
+                    <a:p>
+                      <a:pPr algn="ctr" fontAlgn="ctr"/>
+                      <a:r>
+                        <a:rPr lang="en-US" sz="1100" u="none" strike="noStrike">
+                          <a:effectLst/>
+                        </a:rPr>
+                        <a:t>81 - 86</a:t>
+                      </a:r>
+                      <a:endParaRPr lang="en-US" sz="1100" b="0" i="0" u="none" strike="noStrike">
+                        <a:solidFill>
+                          <a:srgbClr val="000000"/>
+                        </a:solidFill>
+                        <a:effectLst/>
+                        <a:latin typeface="Calibri" panose="020F0502020204030204" pitchFamily="34" charset="0"/>
+                      </a:endParaRPr>
+                    </a:p>
+                  </a:txBody>
+                  <a:tcPr marL="9525" marR="9525" marT="9525" marB="0" anchor="ctr"/>
+                </a:tc>
+                <a:tc>
+                  <a:txBody>
+                    <a:bodyPr/>
+                    <a:lstStyle/>
+                    <a:p>
+                      <a:pPr algn="ctr" fontAlgn="ctr"/>
+                      <a:r>
+                        <a:rPr lang="en-US" sz="1100" u="none" strike="noStrike">
+                          <a:effectLst/>
+                        </a:rPr>
+                        <a:t>11</a:t>
+                      </a:r>
+                      <a:endParaRPr lang="en-US" sz="1100" b="0" i="0" u="none" strike="noStrike">
+                        <a:solidFill>
+                          <a:srgbClr val="000000"/>
+                        </a:solidFill>
+                        <a:effectLst/>
+                        <a:latin typeface="Calibri" panose="020F0502020204030204" pitchFamily="34" charset="0"/>
+                      </a:endParaRPr>
+                    </a:p>
+                  </a:txBody>
+                  <a:tcPr marL="9525" marR="9525" marT="9525" marB="0" anchor="ctr"/>
+                </a:tc>
+                <a:extLst>
+                  <a:ext uri="{0D108BD9-81ED-4DB2-BD59-A6C34878D82A}">
+                    <a16:rowId xmlns:a16="http://schemas.microsoft.com/office/drawing/2014/main" val="824718103"/>
+                  </a:ext>
+                </a:extLst>
+              </a:tr>
+              <a:tr h="218411">
+                <a:tc>
+                  <a:txBody>
+                    <a:bodyPr/>
+                    <a:lstStyle/>
+                    <a:p>
+                      <a:pPr algn="ctr" fontAlgn="ctr"/>
+                      <a:r>
+                        <a:rPr lang="en-US" sz="1100" u="none" strike="noStrike">
+                          <a:effectLst/>
+                        </a:rPr>
+                        <a:t>87 - 92</a:t>
+                      </a:r>
+                      <a:endParaRPr lang="en-US" sz="1100" b="0" i="0" u="none" strike="noStrike">
+                        <a:solidFill>
+                          <a:srgbClr val="000000"/>
+                        </a:solidFill>
+                        <a:effectLst/>
+                        <a:latin typeface="Calibri" panose="020F0502020204030204" pitchFamily="34" charset="0"/>
+                      </a:endParaRPr>
+                    </a:p>
+                  </a:txBody>
+                  <a:tcPr marL="9525" marR="9525" marT="9525" marB="0" anchor="ctr"/>
+                </a:tc>
+                <a:tc>
+                  <a:txBody>
+                    <a:bodyPr/>
+                    <a:lstStyle/>
+                    <a:p>
+                      <a:pPr algn="ctr" fontAlgn="ctr"/>
+                      <a:r>
+                        <a:rPr lang="en-US" sz="1100" u="none" strike="noStrike" dirty="0">
+                          <a:effectLst/>
+                        </a:rPr>
+                        <a:t>15</a:t>
+                      </a:r>
+                      <a:endParaRPr lang="en-US" sz="1100" b="0" i="0" u="none" strike="noStrike" dirty="0">
+                        <a:solidFill>
+                          <a:srgbClr val="000000"/>
+                        </a:solidFill>
+                        <a:effectLst/>
+                        <a:latin typeface="Calibri" panose="020F0502020204030204" pitchFamily="34" charset="0"/>
+                      </a:endParaRPr>
+                    </a:p>
+                  </a:txBody>
+                  <a:tcPr marL="9525" marR="9525" marT="9525" marB="0" anchor="ctr"/>
+                </a:tc>
+                <a:extLst>
+                  <a:ext uri="{0D108BD9-81ED-4DB2-BD59-A6C34878D82A}">
+                    <a16:rowId xmlns:a16="http://schemas.microsoft.com/office/drawing/2014/main" val="2660047154"/>
+                  </a:ext>
+                </a:extLst>
+              </a:tr>
+              <a:tr h="218411">
+                <a:tc>
+                  <a:txBody>
+                    <a:bodyPr/>
+                    <a:lstStyle/>
+                    <a:p>
+                      <a:pPr algn="ctr" fontAlgn="ctr"/>
+                      <a:r>
+                        <a:rPr lang="en-US" sz="1100" u="none" strike="noStrike">
+                          <a:effectLst/>
+                        </a:rPr>
+                        <a:t>93 - 98</a:t>
+                      </a:r>
+                      <a:endParaRPr lang="en-US" sz="1100" b="0" i="0" u="none" strike="noStrike">
+                        <a:solidFill>
+                          <a:srgbClr val="000000"/>
+                        </a:solidFill>
+                        <a:effectLst/>
+                        <a:latin typeface="Calibri" panose="020F0502020204030204" pitchFamily="34" charset="0"/>
+                      </a:endParaRPr>
+                    </a:p>
+                  </a:txBody>
+                  <a:tcPr marL="9525" marR="9525" marT="9525" marB="0" anchor="ctr"/>
+                </a:tc>
+                <a:tc>
+                  <a:txBody>
+                    <a:bodyPr/>
+                    <a:lstStyle/>
+                    <a:p>
+                      <a:pPr algn="ctr" fontAlgn="ctr"/>
+                      <a:r>
+                        <a:rPr lang="en-US" sz="1100" u="none" strike="noStrike">
+                          <a:effectLst/>
+                        </a:rPr>
+                        <a:t>13</a:t>
+                      </a:r>
+                      <a:endParaRPr lang="en-US" sz="1100" b="0" i="0" u="none" strike="noStrike">
+                        <a:solidFill>
+                          <a:srgbClr val="000000"/>
+                        </a:solidFill>
+                        <a:effectLst/>
+                        <a:latin typeface="Calibri" panose="020F0502020204030204" pitchFamily="34" charset="0"/>
+                      </a:endParaRPr>
+                    </a:p>
+                  </a:txBody>
+                  <a:tcPr marL="9525" marR="9525" marT="9525" marB="0" anchor="ctr"/>
+                </a:tc>
+                <a:extLst>
+                  <a:ext uri="{0D108BD9-81ED-4DB2-BD59-A6C34878D82A}">
+                    <a16:rowId xmlns:a16="http://schemas.microsoft.com/office/drawing/2014/main" val="3398479585"/>
+                  </a:ext>
+                </a:extLst>
+              </a:tr>
+              <a:tr h="218411">
+                <a:tc>
+                  <a:txBody>
+                    <a:bodyPr/>
+                    <a:lstStyle/>
+                    <a:p>
+                      <a:pPr algn="ctr" fontAlgn="ctr"/>
+                      <a:r>
+                        <a:rPr lang="en-US" sz="1100" u="none" strike="noStrike">
+                          <a:effectLst/>
+                        </a:rPr>
+                        <a:t>Jumlah</a:t>
+                      </a:r>
+                      <a:endParaRPr lang="en-US" sz="1100" b="0" i="0" u="none" strike="noStrike">
+                        <a:solidFill>
+                          <a:srgbClr val="000000"/>
+                        </a:solidFill>
+                        <a:effectLst/>
+                        <a:latin typeface="Calibri" panose="020F0502020204030204" pitchFamily="34" charset="0"/>
+                      </a:endParaRPr>
+                    </a:p>
+                  </a:txBody>
+                  <a:tcPr marL="9525" marR="9525" marT="9525" marB="0" anchor="ctr"/>
+                </a:tc>
+                <a:tc>
+                  <a:txBody>
+                    <a:bodyPr/>
+                    <a:lstStyle/>
+                    <a:p>
+                      <a:pPr algn="ctr" fontAlgn="ctr"/>
+                      <a:r>
+                        <a:rPr lang="en-US" sz="1100" u="none" strike="noStrike" dirty="0">
+                          <a:effectLst/>
+                        </a:rPr>
+                        <a:t>50</a:t>
+                      </a:r>
+                      <a:endParaRPr lang="en-US" sz="1100" b="0" i="0" u="none" strike="noStrike" dirty="0">
+                        <a:solidFill>
+                          <a:srgbClr val="000000"/>
+                        </a:solidFill>
+                        <a:effectLst/>
+                        <a:latin typeface="Calibri" panose="020F0502020204030204" pitchFamily="34" charset="0"/>
+                      </a:endParaRPr>
+                    </a:p>
+                  </a:txBody>
+                  <a:tcPr marL="9525" marR="9525" marT="9525" marB="0" anchor="ctr"/>
+                </a:tc>
+                <a:extLst>
+                  <a:ext uri="{0D108BD9-81ED-4DB2-BD59-A6C34878D82A}">
+                    <a16:rowId xmlns:a16="http://schemas.microsoft.com/office/drawing/2014/main" val="1100737058"/>
+                  </a:ext>
+                </a:extLst>
+              </a:tr>
+            </a:tbl>
+          </a:graphicData>
+        </a:graphic>
+      </p:graphicFrame>
+    </p:spTree>
+    <p:extLst>
+      <p:ext uri="{BB962C8B-B14F-4D97-AF65-F5344CB8AC3E}">
+        <p14:creationId xmlns:p14="http://schemas.microsoft.com/office/powerpoint/2010/main" val="2385483978"/>
       </p:ext>
     </p:extLst>
   </p:cSld>

</xml_diff>